<commit_message>
Finished forward propagation part
</commit_message>
<xml_diff>
--- a/theory/result_presentation.pptx
+++ b/theory/result_presentation.pptx
@@ -508,6 +508,94 @@
           <a:bodyPr/>
           <a:lstStyle/>
           <a:p>
+            <a:pPr marL="0" indent="0">
+              <a:buFont typeface="Arial" panose="020B0604020202020204" pitchFamily="34" charset="0"/>
+              <a:buNone/>
+            </a:pPr>
+            <a:endParaRPr lang="de-DE" dirty="0"/>
+          </a:p>
+        </p:txBody>
+      </p:sp>
+      <p:sp>
+        <p:nvSpPr>
+          <p:cNvPr id="4" name="Foliennummernplatzhalter 3"/>
+          <p:cNvSpPr>
+            <a:spLocks noGrp="1"/>
+          </p:cNvSpPr>
+          <p:nvPr>
+            <p:ph type="sldNum" sz="quarter" idx="5"/>
+          </p:nvPr>
+        </p:nvSpPr>
+        <p:spPr/>
+        <p:txBody>
+          <a:bodyPr/>
+          <a:lstStyle/>
+          <a:p>
+            <a:fld id="{D4C12A24-BF94-4906-B274-F5BF4D611E23}" type="slidenum">
+              <a:rPr lang="de-DE" smtClean="0"/>
+              <a:t>2</a:t>
+            </a:fld>
+            <a:endParaRPr lang="de-DE"/>
+          </a:p>
+        </p:txBody>
+      </p:sp>
+    </p:spTree>
+    <p:extLst>
+      <p:ext uri="{BB962C8B-B14F-4D97-AF65-F5344CB8AC3E}">
+        <p14:creationId xmlns:p14="http://schemas.microsoft.com/office/powerpoint/2010/main" val="1223256641"/>
+      </p:ext>
+    </p:extLst>
+  </p:cSld>
+  <p:clrMapOvr>
+    <a:masterClrMapping/>
+  </p:clrMapOvr>
+</p:notes>
+</file>
+
+<file path=ppt/notesSlides/notesSlide2.xml><?xml version="1.0" encoding="utf-8"?>
+<p:notes xmlns:a="http://schemas.openxmlformats.org/drawingml/2006/main" xmlns:r="http://schemas.openxmlformats.org/officeDocument/2006/relationships" xmlns:p="http://schemas.openxmlformats.org/presentationml/2006/main">
+  <p:cSld>
+    <p:spTree>
+      <p:nvGrpSpPr>
+        <p:cNvPr id="1" name=""/>
+        <p:cNvGrpSpPr/>
+        <p:nvPr/>
+      </p:nvGrpSpPr>
+      <p:grpSpPr>
+        <a:xfrm>
+          <a:off x="0" y="0"/>
+          <a:ext cx="0" cy="0"/>
+          <a:chOff x="0" y="0"/>
+          <a:chExt cx="0" cy="0"/>
+        </a:xfrm>
+      </p:grpSpPr>
+      <p:sp>
+        <p:nvSpPr>
+          <p:cNvPr id="2" name="Folienbildplatzhalter 1"/>
+          <p:cNvSpPr>
+            <a:spLocks noGrp="1" noRot="1" noChangeAspect="1"/>
+          </p:cNvSpPr>
+          <p:nvPr>
+            <p:ph type="sldImg"/>
+          </p:nvPr>
+        </p:nvSpPr>
+        <p:spPr/>
+      </p:sp>
+      <p:sp>
+        <p:nvSpPr>
+          <p:cNvPr id="3" name="Notizenplatzhalter 2"/>
+          <p:cNvSpPr>
+            <a:spLocks noGrp="1"/>
+          </p:cNvSpPr>
+          <p:nvPr>
+            <p:ph type="body" idx="1"/>
+          </p:nvPr>
+        </p:nvSpPr>
+        <p:spPr/>
+        <p:txBody>
+          <a:bodyPr/>
+          <a:lstStyle/>
+          <a:p>
             <a:pPr marL="171450" indent="-171450">
               <a:buFont typeface="Arial" panose="020B0604020202020204" pitchFamily="34" charset="0"/>
               <a:buChar char="•"/>
@@ -543,6 +631,94 @@
     <p:extLst>
       <p:ext uri="{BB962C8B-B14F-4D97-AF65-F5344CB8AC3E}">
         <p14:creationId xmlns:p14="http://schemas.microsoft.com/office/powerpoint/2010/main" val="865780576"/>
+      </p:ext>
+    </p:extLst>
+  </p:cSld>
+  <p:clrMapOvr>
+    <a:masterClrMapping/>
+  </p:clrMapOvr>
+</p:notes>
+</file>
+
+<file path=ppt/notesSlides/notesSlide3.xml><?xml version="1.0" encoding="utf-8"?>
+<p:notes xmlns:a="http://schemas.openxmlformats.org/drawingml/2006/main" xmlns:r="http://schemas.openxmlformats.org/officeDocument/2006/relationships" xmlns:p="http://schemas.openxmlformats.org/presentationml/2006/main">
+  <p:cSld>
+    <p:spTree>
+      <p:nvGrpSpPr>
+        <p:cNvPr id="1" name=""/>
+        <p:cNvGrpSpPr/>
+        <p:nvPr/>
+      </p:nvGrpSpPr>
+      <p:grpSpPr>
+        <a:xfrm>
+          <a:off x="0" y="0"/>
+          <a:ext cx="0" cy="0"/>
+          <a:chOff x="0" y="0"/>
+          <a:chExt cx="0" cy="0"/>
+        </a:xfrm>
+      </p:grpSpPr>
+      <p:sp>
+        <p:nvSpPr>
+          <p:cNvPr id="2" name="Folienbildplatzhalter 1"/>
+          <p:cNvSpPr>
+            <a:spLocks noGrp="1" noRot="1" noChangeAspect="1"/>
+          </p:cNvSpPr>
+          <p:nvPr>
+            <p:ph type="sldImg"/>
+          </p:nvPr>
+        </p:nvSpPr>
+        <p:spPr/>
+      </p:sp>
+      <p:sp>
+        <p:nvSpPr>
+          <p:cNvPr id="3" name="Notizenplatzhalter 2"/>
+          <p:cNvSpPr>
+            <a:spLocks noGrp="1"/>
+          </p:cNvSpPr>
+          <p:nvPr>
+            <p:ph type="body" idx="1"/>
+          </p:nvPr>
+        </p:nvSpPr>
+        <p:spPr/>
+        <p:txBody>
+          <a:bodyPr/>
+          <a:lstStyle/>
+          <a:p>
+            <a:pPr marL="171450" indent="-171450">
+              <a:buFont typeface="Arial" panose="020B0604020202020204" pitchFamily="34" charset="0"/>
+              <a:buChar char="•"/>
+            </a:pPr>
+            <a:endParaRPr lang="de-DE" dirty="0"/>
+          </a:p>
+        </p:txBody>
+      </p:sp>
+      <p:sp>
+        <p:nvSpPr>
+          <p:cNvPr id="4" name="Foliennummernplatzhalter 3"/>
+          <p:cNvSpPr>
+            <a:spLocks noGrp="1"/>
+          </p:cNvSpPr>
+          <p:nvPr>
+            <p:ph type="sldNum" sz="quarter" idx="5"/>
+          </p:nvPr>
+        </p:nvSpPr>
+        <p:spPr/>
+        <p:txBody>
+          <a:bodyPr/>
+          <a:lstStyle/>
+          <a:p>
+            <a:fld id="{D4C12A24-BF94-4906-B274-F5BF4D611E23}" type="slidenum">
+              <a:rPr lang="de-DE" smtClean="0"/>
+              <a:t>5</a:t>
+            </a:fld>
+            <a:endParaRPr lang="de-DE"/>
+          </a:p>
+        </p:txBody>
+      </p:sp>
+    </p:spTree>
+    <p:extLst>
+      <p:ext uri="{BB962C8B-B14F-4D97-AF65-F5344CB8AC3E}">
+        <p14:creationId xmlns:p14="http://schemas.microsoft.com/office/powerpoint/2010/main" val="2566889553"/>
       </p:ext>
     </p:extLst>
   </p:cSld>
@@ -3939,7 +4115,7 @@
           <a:p>
             <a:r>
               <a:rPr lang="de-DE" dirty="0"/>
-              <a:t>Implementierung in Python</a:t>
+              <a:t>Implementierung in Python und daraus gelernte Erfahrungen</a:t>
             </a:r>
           </a:p>
           <a:p>
@@ -4194,97 +4370,240 @@
           </a:prstGeom>
         </p:spPr>
       </p:pic>
-      <p:sp>
-        <p:nvSpPr>
-          <p:cNvPr id="14" name="Textfeld 13">
-            <a:extLst>
-              <a:ext uri="{FF2B5EF4-FFF2-40B4-BE49-F238E27FC236}">
-                <a16:creationId xmlns:a16="http://schemas.microsoft.com/office/drawing/2014/main" id="{D6EE6F43-131D-4F55-AF5C-F1CDDA934584}"/>
-              </a:ext>
-            </a:extLst>
-          </p:cNvPr>
-          <p:cNvSpPr txBox="1"/>
-          <p:nvPr/>
-        </p:nvSpPr>
-        <p:spPr>
-          <a:xfrm>
-            <a:off x="7657513" y="1840184"/>
-            <a:ext cx="4122927" cy="2031325"/>
-          </a:xfrm>
-          <a:prstGeom prst="rect">
-            <a:avLst/>
-          </a:prstGeom>
-          <a:noFill/>
-        </p:spPr>
-        <p:txBody>
-          <a:bodyPr wrap="square" rtlCol="0">
-            <a:spAutoFit/>
-          </a:bodyPr>
-          <a:lstStyle/>
-          <a:p>
-            <a:pPr marL="285750" indent="-285750">
-              <a:buFont typeface="Arial" panose="020B0604020202020204" pitchFamily="34" charset="0"/>
-              <a:buChar char="•"/>
-            </a:pPr>
-            <a:r>
-              <a:rPr lang="de-DE" dirty="0"/>
-              <a:t>x = a^0</a:t>
-            </a:r>
-          </a:p>
-          <a:p>
-            <a:pPr marL="285750" indent="-285750">
-              <a:buFont typeface="Arial" panose="020B0604020202020204" pitchFamily="34" charset="0"/>
-              <a:buChar char="•"/>
-            </a:pPr>
-            <a:r>
-              <a:rPr lang="de-DE" dirty="0"/>
-              <a:t>z = dendritische Potentiale</a:t>
-            </a:r>
-          </a:p>
-          <a:p>
-            <a:pPr marL="285750" indent="-285750">
-              <a:buFont typeface="Arial" panose="020B0604020202020204" pitchFamily="34" charset="0"/>
-              <a:buChar char="•"/>
-            </a:pPr>
-            <a:r>
-              <a:rPr lang="de-DE" dirty="0"/>
-              <a:t>a = Aktivierungen</a:t>
-            </a:r>
-          </a:p>
-          <a:p>
-            <a:pPr marL="285750" indent="-285750">
-              <a:buFont typeface="Arial" panose="020B0604020202020204" pitchFamily="34" charset="0"/>
-              <a:buChar char="•"/>
-            </a:pPr>
-            <a:r>
-              <a:rPr lang="de-DE" dirty="0" err="1"/>
-              <a:t>w^l</a:t>
-            </a:r>
-            <a:r>
-              <a:rPr lang="de-DE" dirty="0"/>
-              <a:t>_{</a:t>
-            </a:r>
-            <a:r>
-              <a:rPr lang="de-DE" dirty="0" err="1"/>
-              <a:t>j,k</a:t>
-            </a:r>
-            <a:r>
-              <a:rPr lang="de-DE" dirty="0"/>
-              <a:t>} =  Gewicht welches Neuron j in Layer l mit Neuron k in Layer l-1 verbindet</a:t>
-            </a:r>
-          </a:p>
-          <a:p>
-            <a:pPr marL="285750" indent="-285750">
-              <a:buFont typeface="Arial" panose="020B0604020202020204" pitchFamily="34" charset="0"/>
-              <a:buChar char="•"/>
-            </a:pPr>
-            <a:r>
-              <a:rPr lang="de-DE" dirty="0"/>
-              <a:t>Input Layer hat keine Gewichte</a:t>
-            </a:r>
-          </a:p>
-        </p:txBody>
-      </p:sp>
+      <mc:AlternateContent xmlns:mc="http://schemas.openxmlformats.org/markup-compatibility/2006">
+        <mc:Choice xmlns:a14="http://schemas.microsoft.com/office/drawing/2010/main" Requires="a14">
+          <p:sp>
+            <p:nvSpPr>
+              <p:cNvPr id="14" name="Textfeld 13">
+                <a:extLst>
+                  <a:ext uri="{FF2B5EF4-FFF2-40B4-BE49-F238E27FC236}">
+                    <a16:creationId xmlns:a16="http://schemas.microsoft.com/office/drawing/2014/main" id="{D6EE6F43-131D-4F55-AF5C-F1CDDA934584}"/>
+                  </a:ext>
+                </a:extLst>
+              </p:cNvPr>
+              <p:cNvSpPr txBox="1"/>
+              <p:nvPr/>
+            </p:nvSpPr>
+            <p:spPr>
+              <a:xfrm>
+                <a:off x="7657513" y="1840184"/>
+                <a:ext cx="4122927" cy="2094932"/>
+              </a:xfrm>
+              <a:prstGeom prst="rect">
+                <a:avLst/>
+              </a:prstGeom>
+              <a:noFill/>
+            </p:spPr>
+            <p:txBody>
+              <a:bodyPr wrap="square" rtlCol="0">
+                <a:spAutoFit/>
+              </a:bodyPr>
+              <a:lstStyle/>
+              <a:p>
+                <a:pPr marL="285750" indent="-285750">
+                  <a:buFont typeface="Arial" panose="020B0604020202020204" pitchFamily="34" charset="0"/>
+                  <a:buChar char="•"/>
+                </a:pPr>
+                <a14:m>
+                  <m:oMath xmlns:m="http://schemas.openxmlformats.org/officeDocument/2006/math">
+                    <m:r>
+                      <a:rPr lang="de-DE" b="0" i="1" smtClean="0">
+                        <a:latin typeface="Cambria Math" panose="02040503050406030204" pitchFamily="18" charset="0"/>
+                      </a:rPr>
+                      <m:t>𝑥</m:t>
+                    </m:r>
+                    <m:r>
+                      <a:rPr lang="de-DE" b="0" i="1" smtClean="0">
+                        <a:latin typeface="Cambria Math" panose="02040503050406030204" pitchFamily="18" charset="0"/>
+                      </a:rPr>
+                      <m:t>=</m:t>
+                    </m:r>
+                    <m:sSup>
+                      <m:sSupPr>
+                        <m:ctrlPr>
+                          <a:rPr lang="de-DE" b="0" i="1" smtClean="0">
+                            <a:latin typeface="Cambria Math" panose="02040503050406030204" pitchFamily="18" charset="0"/>
+                          </a:rPr>
+                        </m:ctrlPr>
+                      </m:sSupPr>
+                      <m:e>
+                        <m:r>
+                          <a:rPr lang="de-DE" b="0" i="1" smtClean="0">
+                            <a:latin typeface="Cambria Math" panose="02040503050406030204" pitchFamily="18" charset="0"/>
+                          </a:rPr>
+                          <m:t>𝑎</m:t>
+                        </m:r>
+                      </m:e>
+                      <m:sup>
+                        <m:r>
+                          <a:rPr lang="de-DE" b="0" i="1" smtClean="0">
+                            <a:latin typeface="Cambria Math" panose="02040503050406030204" pitchFamily="18" charset="0"/>
+                          </a:rPr>
+                          <m:t>0</m:t>
+                        </m:r>
+                      </m:sup>
+                    </m:sSup>
+                  </m:oMath>
+                </a14:m>
+                <a:endParaRPr lang="de-DE" dirty="0"/>
+              </a:p>
+              <a:p>
+                <a:pPr marL="285750" indent="-285750">
+                  <a:buFont typeface="Arial" panose="020B0604020202020204" pitchFamily="34" charset="0"/>
+                  <a:buChar char="•"/>
+                </a:pPr>
+                <a14:m>
+                  <m:oMath xmlns:m="http://schemas.openxmlformats.org/officeDocument/2006/math">
+                    <m:r>
+                      <a:rPr lang="de-DE" b="0" i="1" smtClean="0">
+                        <a:latin typeface="Cambria Math" panose="02040503050406030204" pitchFamily="18" charset="0"/>
+                      </a:rPr>
+                      <m:t>𝑧</m:t>
+                    </m:r>
+                  </m:oMath>
+                </a14:m>
+                <a:r>
+                  <a:rPr lang="de-DE" dirty="0"/>
+                  <a:t> = dendritische Potentiale</a:t>
+                </a:r>
+              </a:p>
+              <a:p>
+                <a:pPr marL="285750" indent="-285750">
+                  <a:buFont typeface="Arial" panose="020B0604020202020204" pitchFamily="34" charset="0"/>
+                  <a:buChar char="•"/>
+                </a:pPr>
+                <a14:m>
+                  <m:oMath xmlns:m="http://schemas.openxmlformats.org/officeDocument/2006/math">
+                    <m:r>
+                      <a:rPr lang="de-DE" b="0" i="1" smtClean="0">
+                        <a:latin typeface="Cambria Math" panose="02040503050406030204" pitchFamily="18" charset="0"/>
+                      </a:rPr>
+                      <m:t>𝑎</m:t>
+                    </m:r>
+                  </m:oMath>
+                </a14:m>
+                <a:r>
+                  <a:rPr lang="de-DE" dirty="0"/>
+                  <a:t> = Aktivierungen</a:t>
+                </a:r>
+              </a:p>
+              <a:p>
+                <a:pPr marL="285750" indent="-285750">
+                  <a:buFont typeface="Arial" panose="020B0604020202020204" pitchFamily="34" charset="0"/>
+                  <a:buChar char="•"/>
+                </a:pPr>
+                <a14:m>
+                  <m:oMath xmlns:m="http://schemas.openxmlformats.org/officeDocument/2006/math">
+                    <m:sSubSup>
+                      <m:sSubSupPr>
+                        <m:ctrlPr>
+                          <a:rPr lang="de-DE" b="0" i="1" smtClean="0">
+                            <a:latin typeface="Cambria Math" panose="02040503050406030204" pitchFamily="18" charset="0"/>
+                          </a:rPr>
+                        </m:ctrlPr>
+                      </m:sSubSupPr>
+                      <m:e>
+                        <m:r>
+                          <a:rPr lang="de-DE" b="0" i="1" smtClean="0">
+                            <a:latin typeface="Cambria Math" panose="02040503050406030204" pitchFamily="18" charset="0"/>
+                          </a:rPr>
+                          <m:t>𝑤</m:t>
+                        </m:r>
+                      </m:e>
+                      <m:sub>
+                        <m:r>
+                          <a:rPr lang="de-DE" b="0" i="1" smtClean="0">
+                            <a:latin typeface="Cambria Math" panose="02040503050406030204" pitchFamily="18" charset="0"/>
+                          </a:rPr>
+                          <m:t>𝑗</m:t>
+                        </m:r>
+                        <m:r>
+                          <a:rPr lang="de-DE" b="0" i="1" smtClean="0">
+                            <a:latin typeface="Cambria Math" panose="02040503050406030204" pitchFamily="18" charset="0"/>
+                          </a:rPr>
+                          <m:t>,</m:t>
+                        </m:r>
+                        <m:r>
+                          <a:rPr lang="de-DE" b="0" i="1" smtClean="0">
+                            <a:latin typeface="Cambria Math" panose="02040503050406030204" pitchFamily="18" charset="0"/>
+                          </a:rPr>
+                          <m:t>𝑘</m:t>
+                        </m:r>
+                      </m:sub>
+                      <m:sup>
+                        <m:r>
+                          <a:rPr lang="de-DE" b="0" i="1" smtClean="0">
+                            <a:latin typeface="Cambria Math" panose="02040503050406030204" pitchFamily="18" charset="0"/>
+                          </a:rPr>
+                          <m:t>𝑙</m:t>
+                        </m:r>
+                      </m:sup>
+                    </m:sSubSup>
+                  </m:oMath>
+                </a14:m>
+                <a:r>
+                  <a:rPr lang="de-DE" dirty="0"/>
+                  <a:t> =  Gewicht welches Neuron j in Layer l mit Neuron k in Layer l-1 verbindet</a:t>
+                </a:r>
+              </a:p>
+              <a:p>
+                <a:pPr marL="285750" indent="-285750">
+                  <a:buFont typeface="Arial" panose="020B0604020202020204" pitchFamily="34" charset="0"/>
+                  <a:buChar char="•"/>
+                </a:pPr>
+                <a:r>
+                  <a:rPr lang="de-DE" dirty="0"/>
+                  <a:t>Input Layer hat keine Gewichte</a:t>
+                </a:r>
+              </a:p>
+            </p:txBody>
+          </p:sp>
+        </mc:Choice>
+        <mc:Fallback>
+          <p:sp>
+            <p:nvSpPr>
+              <p:cNvPr id="14" name="Textfeld 13">
+                <a:extLst>
+                  <a:ext uri="{FF2B5EF4-FFF2-40B4-BE49-F238E27FC236}">
+                    <a16:creationId xmlns:a16="http://schemas.microsoft.com/office/drawing/2014/main" id="{D6EE6F43-131D-4F55-AF5C-F1CDDA934584}"/>
+                  </a:ext>
+                </a:extLst>
+              </p:cNvPr>
+              <p:cNvSpPr txBox="1">
+                <a:spLocks noRot="1" noChangeAspect="1" noMove="1" noResize="1" noEditPoints="1" noAdjustHandles="1" noChangeArrowheads="1" noChangeShapeType="1" noTextEdit="1"/>
+              </p:cNvSpPr>
+              <p:nvPr/>
+            </p:nvSpPr>
+            <p:spPr>
+              <a:xfrm>
+                <a:off x="7657513" y="1840184"/>
+                <a:ext cx="4122927" cy="2094932"/>
+              </a:xfrm>
+              <a:prstGeom prst="rect">
+                <a:avLst/>
+              </a:prstGeom>
+              <a:blipFill>
+                <a:blip r:embed="rId4"/>
+                <a:stretch>
+                  <a:fillRect l="-888" t="-872" b="-3198"/>
+                </a:stretch>
+              </a:blipFill>
+            </p:spPr>
+            <p:txBody>
+              <a:bodyPr/>
+              <a:lstStyle/>
+              <a:p>
+                <a:r>
+                  <a:rPr lang="de-DE">
+                    <a:noFill/>
+                  </a:rPr>
+                  <a:t> </a:t>
+                </a:r>
+              </a:p>
+            </p:txBody>
+          </p:sp>
+        </mc:Fallback>
+      </mc:AlternateContent>
     </p:spTree>
     <p:extLst>
       <p:ext uri="{BB962C8B-B14F-4D97-AF65-F5344CB8AC3E}">
@@ -4366,7 +4685,7 @@
           <p:nvPr/>
         </p:nvPicPr>
         <p:blipFill>
-          <a:blip r:embed="rId2"/>
+          <a:blip r:embed="rId3"/>
           <a:stretch>
             <a:fillRect/>
           </a:stretch>
@@ -4396,14 +4715,14 @@
           <p:nvPr/>
         </p:nvPicPr>
         <p:blipFill>
-          <a:blip r:embed="rId3"/>
+          <a:blip r:embed="rId4"/>
           <a:stretch>
             <a:fillRect/>
           </a:stretch>
         </p:blipFill>
         <p:spPr>
           <a:xfrm>
-            <a:off x="1492760" y="4308256"/>
+            <a:off x="1394407" y="4161209"/>
             <a:ext cx="1438275" cy="790575"/>
           </a:xfrm>
           <a:prstGeom prst="rect">
@@ -4417,36 +4736,6 @@
             <a:extLst>
               <a:ext uri="{FF2B5EF4-FFF2-40B4-BE49-F238E27FC236}">
                 <a16:creationId xmlns:a16="http://schemas.microsoft.com/office/drawing/2014/main" id="{3F5B3EEF-F3C7-4411-A82C-D1EC0B062A73}"/>
-              </a:ext>
-            </a:extLst>
-          </p:cNvPr>
-          <p:cNvPicPr>
-            <a:picLocks noChangeAspect="1"/>
-          </p:cNvPicPr>
-          <p:nvPr/>
-        </p:nvPicPr>
-        <p:blipFill>
-          <a:blip r:embed="rId4"/>
-          <a:stretch>
-            <a:fillRect/>
-          </a:stretch>
-        </p:blipFill>
-        <p:spPr>
-          <a:xfrm>
-            <a:off x="4170548" y="1613936"/>
-            <a:ext cx="5724525" cy="1971675"/>
-          </a:xfrm>
-          <a:prstGeom prst="rect">
-            <a:avLst/>
-          </a:prstGeom>
-        </p:spPr>
-      </p:pic>
-      <p:pic>
-        <p:nvPicPr>
-          <p:cNvPr id="11" name="Grafik 10">
-            <a:extLst>
-              <a:ext uri="{FF2B5EF4-FFF2-40B4-BE49-F238E27FC236}">
-                <a16:creationId xmlns:a16="http://schemas.microsoft.com/office/drawing/2014/main" id="{20AF9F79-1430-40F6-A6B3-53198F6017CA}"/>
               </a:ext>
             </a:extLst>
           </p:cNvPr>
@@ -4463,8 +4752,38 @@
         </p:blipFill>
         <p:spPr>
           <a:xfrm>
-            <a:off x="5006568" y="3710583"/>
-            <a:ext cx="2085975" cy="1809750"/>
+            <a:off x="4515730" y="1774774"/>
+            <a:ext cx="4413362" cy="1520076"/>
+          </a:xfrm>
+          <a:prstGeom prst="rect">
+            <a:avLst/>
+          </a:prstGeom>
+        </p:spPr>
+      </p:pic>
+      <p:pic>
+        <p:nvPicPr>
+          <p:cNvPr id="11" name="Grafik 10">
+            <a:extLst>
+              <a:ext uri="{FF2B5EF4-FFF2-40B4-BE49-F238E27FC236}">
+                <a16:creationId xmlns:a16="http://schemas.microsoft.com/office/drawing/2014/main" id="{20AF9F79-1430-40F6-A6B3-53198F6017CA}"/>
+              </a:ext>
+            </a:extLst>
+          </p:cNvPr>
+          <p:cNvPicPr>
+            <a:picLocks noChangeAspect="1"/>
+          </p:cNvPicPr>
+          <p:nvPr/>
+        </p:nvPicPr>
+        <p:blipFill>
+          <a:blip r:embed="rId6"/>
+          <a:stretch>
+            <a:fillRect/>
+          </a:stretch>
+        </p:blipFill>
+        <p:spPr>
+          <a:xfrm>
+            <a:off x="5222097" y="3877072"/>
+            <a:ext cx="1547094" cy="1342228"/>
           </a:xfrm>
           <a:prstGeom prst="rect">
             <a:avLst/>
@@ -4537,7 +4856,7 @@
         </p:nvSpPr>
         <p:spPr>
           <a:xfrm>
-            <a:off x="3658409" y="4548347"/>
+            <a:off x="3625584" y="4283953"/>
             <a:ext cx="620785" cy="411060"/>
           </a:xfrm>
           <a:prstGeom prst="rightArrow">
@@ -4590,21 +4909,784 @@
           <p:nvPr/>
         </p:nvPicPr>
         <p:blipFill>
-          <a:blip r:embed="rId6"/>
+          <a:blip r:embed="rId7"/>
           <a:stretch>
             <a:fillRect/>
           </a:stretch>
         </p:blipFill>
         <p:spPr>
           <a:xfrm>
-            <a:off x="1693244" y="5635344"/>
-            <a:ext cx="4467225" cy="847725"/>
+            <a:off x="1533810" y="5487645"/>
+            <a:ext cx="3591519" cy="681546"/>
           </a:xfrm>
           <a:prstGeom prst="rect">
             <a:avLst/>
           </a:prstGeom>
         </p:spPr>
       </p:pic>
+      <mc:AlternateContent xmlns:mc="http://schemas.openxmlformats.org/markup-compatibility/2006">
+        <mc:Choice xmlns:a14="http://schemas.microsoft.com/office/drawing/2010/main" Requires="a14">
+          <p:sp>
+            <p:nvSpPr>
+              <p:cNvPr id="10" name="Textfeld 9">
+                <a:extLst>
+                  <a:ext uri="{FF2B5EF4-FFF2-40B4-BE49-F238E27FC236}">
+                    <a16:creationId xmlns:a16="http://schemas.microsoft.com/office/drawing/2014/main" id="{372B4E58-E019-402D-9D1E-08B80E65C066}"/>
+                  </a:ext>
+                </a:extLst>
+              </p:cNvPr>
+              <p:cNvSpPr txBox="1"/>
+              <p:nvPr/>
+            </p:nvSpPr>
+            <p:spPr>
+              <a:xfrm>
+                <a:off x="4519460" y="3310810"/>
+                <a:ext cx="647114" cy="280333"/>
+              </a:xfrm>
+              <a:prstGeom prst="rect">
+                <a:avLst/>
+              </a:prstGeom>
+              <a:noFill/>
+            </p:spPr>
+            <p:txBody>
+              <a:bodyPr wrap="square" rtlCol="0">
+                <a:spAutoFit/>
+              </a:bodyPr>
+              <a:lstStyle/>
+              <a:p>
+                <a:pPr algn="ctr"/>
+                <a14:m>
+                  <m:oMathPara xmlns:m="http://schemas.openxmlformats.org/officeDocument/2006/math">
+                    <m:oMathParaPr>
+                      <m:jc m:val="centerGroup"/>
+                    </m:oMathParaPr>
+                    <m:oMath xmlns:m="http://schemas.openxmlformats.org/officeDocument/2006/math">
+                      <m:sSup>
+                        <m:sSupPr>
+                          <m:ctrlPr>
+                            <a:rPr lang="de-DE" sz="1200" b="0" i="1" smtClean="0">
+                              <a:latin typeface="Cambria Math" panose="02040503050406030204" pitchFamily="18" charset="0"/>
+                            </a:rPr>
+                          </m:ctrlPr>
+                        </m:sSupPr>
+                        <m:e>
+                          <m:r>
+                            <a:rPr lang="de-DE" sz="1200" b="0" i="1" smtClean="0">
+                              <a:latin typeface="Cambria Math" panose="02040503050406030204" pitchFamily="18" charset="0"/>
+                            </a:rPr>
+                            <m:t>𝑛</m:t>
+                          </m:r>
+                        </m:e>
+                        <m:sup>
+                          <m:r>
+                            <a:rPr lang="de-DE" sz="1200" b="0" i="1" smtClean="0">
+                              <a:latin typeface="Cambria Math" panose="02040503050406030204" pitchFamily="18" charset="0"/>
+                            </a:rPr>
+                            <m:t>𝑙</m:t>
+                          </m:r>
+                        </m:sup>
+                      </m:sSup>
+                      <m:r>
+                        <a:rPr lang="de-DE" sz="1200" b="0" i="1" smtClean="0">
+                          <a:latin typeface="Cambria Math" panose="02040503050406030204" pitchFamily="18" charset="0"/>
+                        </a:rPr>
+                        <m:t>×1</m:t>
+                      </m:r>
+                    </m:oMath>
+                  </m:oMathPara>
+                </a14:m>
+                <a:endParaRPr lang="de-DE" sz="1200" dirty="0"/>
+              </a:p>
+            </p:txBody>
+          </p:sp>
+        </mc:Choice>
+        <mc:Fallback>
+          <p:sp>
+            <p:nvSpPr>
+              <p:cNvPr id="10" name="Textfeld 9">
+                <a:extLst>
+                  <a:ext uri="{FF2B5EF4-FFF2-40B4-BE49-F238E27FC236}">
+                    <a16:creationId xmlns:a16="http://schemas.microsoft.com/office/drawing/2014/main" id="{372B4E58-E019-402D-9D1E-08B80E65C066}"/>
+                  </a:ext>
+                </a:extLst>
+              </p:cNvPr>
+              <p:cNvSpPr txBox="1">
+                <a:spLocks noRot="1" noChangeAspect="1" noMove="1" noResize="1" noEditPoints="1" noAdjustHandles="1" noChangeArrowheads="1" noChangeShapeType="1" noTextEdit="1"/>
+              </p:cNvSpPr>
+              <p:nvPr/>
+            </p:nvSpPr>
+            <p:spPr>
+              <a:xfrm>
+                <a:off x="4519460" y="3310810"/>
+                <a:ext cx="647114" cy="280333"/>
+              </a:xfrm>
+              <a:prstGeom prst="rect">
+                <a:avLst/>
+              </a:prstGeom>
+              <a:blipFill>
+                <a:blip r:embed="rId8"/>
+                <a:stretch>
+                  <a:fillRect/>
+                </a:stretch>
+              </a:blipFill>
+            </p:spPr>
+            <p:txBody>
+              <a:bodyPr/>
+              <a:lstStyle/>
+              <a:p>
+                <a:r>
+                  <a:rPr lang="de-DE">
+                    <a:noFill/>
+                  </a:rPr>
+                  <a:t> </a:t>
+                </a:r>
+              </a:p>
+            </p:txBody>
+          </p:sp>
+        </mc:Fallback>
+      </mc:AlternateContent>
+      <mc:AlternateContent xmlns:mc="http://schemas.openxmlformats.org/markup-compatibility/2006">
+        <mc:Choice xmlns:a14="http://schemas.microsoft.com/office/drawing/2010/main" Requires="a14">
+          <p:sp>
+            <p:nvSpPr>
+              <p:cNvPr id="14" name="Textfeld 13">
+                <a:extLst>
+                  <a:ext uri="{FF2B5EF4-FFF2-40B4-BE49-F238E27FC236}">
+                    <a16:creationId xmlns:a16="http://schemas.microsoft.com/office/drawing/2014/main" id="{64A9DD3F-67DE-450C-BE83-5CFE1889665B}"/>
+                  </a:ext>
+                </a:extLst>
+              </p:cNvPr>
+              <p:cNvSpPr txBox="1"/>
+              <p:nvPr/>
+            </p:nvSpPr>
+            <p:spPr>
+              <a:xfrm>
+                <a:off x="5881681" y="3310810"/>
+                <a:ext cx="1312060" cy="280333"/>
+              </a:xfrm>
+              <a:prstGeom prst="rect">
+                <a:avLst/>
+              </a:prstGeom>
+              <a:noFill/>
+            </p:spPr>
+            <p:txBody>
+              <a:bodyPr wrap="square" rtlCol="0">
+                <a:spAutoFit/>
+              </a:bodyPr>
+              <a:lstStyle/>
+              <a:p>
+                <a:pPr algn="ctr"/>
+                <a14:m>
+                  <m:oMathPara xmlns:m="http://schemas.openxmlformats.org/officeDocument/2006/math">
+                    <m:oMathParaPr>
+                      <m:jc m:val="centerGroup"/>
+                    </m:oMathParaPr>
+                    <m:oMath xmlns:m="http://schemas.openxmlformats.org/officeDocument/2006/math">
+                      <m:sSup>
+                        <m:sSupPr>
+                          <m:ctrlPr>
+                            <a:rPr lang="de-DE" sz="1200" b="0" i="1" smtClean="0">
+                              <a:latin typeface="Cambria Math" panose="02040503050406030204" pitchFamily="18" charset="0"/>
+                            </a:rPr>
+                          </m:ctrlPr>
+                        </m:sSupPr>
+                        <m:e>
+                          <m:r>
+                            <a:rPr lang="de-DE" sz="1200" b="0" i="1" smtClean="0">
+                              <a:latin typeface="Cambria Math" panose="02040503050406030204" pitchFamily="18" charset="0"/>
+                            </a:rPr>
+                            <m:t>𝑛</m:t>
+                          </m:r>
+                        </m:e>
+                        <m:sup>
+                          <m:r>
+                            <a:rPr lang="de-DE" sz="1200" b="0" i="1" smtClean="0">
+                              <a:latin typeface="Cambria Math" panose="02040503050406030204" pitchFamily="18" charset="0"/>
+                            </a:rPr>
+                            <m:t>𝑙</m:t>
+                          </m:r>
+                        </m:sup>
+                      </m:sSup>
+                      <m:r>
+                        <a:rPr lang="de-DE" sz="1200" b="0" i="1" smtClean="0">
+                          <a:latin typeface="Cambria Math" panose="02040503050406030204" pitchFamily="18" charset="0"/>
+                        </a:rPr>
+                        <m:t>×</m:t>
+                      </m:r>
+                      <m:sSup>
+                        <m:sSupPr>
+                          <m:ctrlPr>
+                            <a:rPr lang="de-DE" sz="1200" b="0" i="1" smtClean="0">
+                              <a:latin typeface="Cambria Math" panose="02040503050406030204" pitchFamily="18" charset="0"/>
+                            </a:rPr>
+                          </m:ctrlPr>
+                        </m:sSupPr>
+                        <m:e>
+                          <m:r>
+                            <a:rPr lang="de-DE" sz="1200" b="0" i="1" smtClean="0">
+                              <a:latin typeface="Cambria Math" panose="02040503050406030204" pitchFamily="18" charset="0"/>
+                            </a:rPr>
+                            <m:t>𝑛</m:t>
+                          </m:r>
+                        </m:e>
+                        <m:sup>
+                          <m:r>
+                            <a:rPr lang="de-DE" sz="1200" b="0" i="1" smtClean="0">
+                              <a:latin typeface="Cambria Math" panose="02040503050406030204" pitchFamily="18" charset="0"/>
+                            </a:rPr>
+                            <m:t>𝑙</m:t>
+                          </m:r>
+                          <m:r>
+                            <a:rPr lang="de-DE" sz="1200" b="0" i="1" smtClean="0">
+                              <a:latin typeface="Cambria Math" panose="02040503050406030204" pitchFamily="18" charset="0"/>
+                            </a:rPr>
+                            <m:t>−1</m:t>
+                          </m:r>
+                        </m:sup>
+                      </m:sSup>
+                    </m:oMath>
+                  </m:oMathPara>
+                </a14:m>
+                <a:endParaRPr lang="de-DE" sz="1200" dirty="0"/>
+              </a:p>
+            </p:txBody>
+          </p:sp>
+        </mc:Choice>
+        <mc:Fallback>
+          <p:sp>
+            <p:nvSpPr>
+              <p:cNvPr id="14" name="Textfeld 13">
+                <a:extLst>
+                  <a:ext uri="{FF2B5EF4-FFF2-40B4-BE49-F238E27FC236}">
+                    <a16:creationId xmlns:a16="http://schemas.microsoft.com/office/drawing/2014/main" id="{64A9DD3F-67DE-450C-BE83-5CFE1889665B}"/>
+                  </a:ext>
+                </a:extLst>
+              </p:cNvPr>
+              <p:cNvSpPr txBox="1">
+                <a:spLocks noRot="1" noChangeAspect="1" noMove="1" noResize="1" noEditPoints="1" noAdjustHandles="1" noChangeArrowheads="1" noChangeShapeType="1" noTextEdit="1"/>
+              </p:cNvSpPr>
+              <p:nvPr/>
+            </p:nvSpPr>
+            <p:spPr>
+              <a:xfrm>
+                <a:off x="5881681" y="3310810"/>
+                <a:ext cx="1312060" cy="280333"/>
+              </a:xfrm>
+              <a:prstGeom prst="rect">
+                <a:avLst/>
+              </a:prstGeom>
+              <a:blipFill>
+                <a:blip r:embed="rId9"/>
+                <a:stretch>
+                  <a:fillRect/>
+                </a:stretch>
+              </a:blipFill>
+            </p:spPr>
+            <p:txBody>
+              <a:bodyPr/>
+              <a:lstStyle/>
+              <a:p>
+                <a:r>
+                  <a:rPr lang="de-DE">
+                    <a:noFill/>
+                  </a:rPr>
+                  <a:t> </a:t>
+                </a:r>
+              </a:p>
+            </p:txBody>
+          </p:sp>
+        </mc:Fallback>
+      </mc:AlternateContent>
+      <mc:AlternateContent xmlns:mc="http://schemas.openxmlformats.org/markup-compatibility/2006">
+        <mc:Choice xmlns:a14="http://schemas.microsoft.com/office/drawing/2010/main" Requires="a14">
+          <p:sp>
+            <p:nvSpPr>
+              <p:cNvPr id="15" name="Textfeld 14">
+                <a:extLst>
+                  <a:ext uri="{FF2B5EF4-FFF2-40B4-BE49-F238E27FC236}">
+                    <a16:creationId xmlns:a16="http://schemas.microsoft.com/office/drawing/2014/main" id="{1481A1BE-0DF5-47A2-A991-A44404B69EE5}"/>
+                  </a:ext>
+                </a:extLst>
+              </p:cNvPr>
+              <p:cNvSpPr txBox="1"/>
+              <p:nvPr/>
+            </p:nvSpPr>
+            <p:spPr>
+              <a:xfrm>
+                <a:off x="7352001" y="3310810"/>
+                <a:ext cx="1113693" cy="280333"/>
+              </a:xfrm>
+              <a:prstGeom prst="rect">
+                <a:avLst/>
+              </a:prstGeom>
+              <a:noFill/>
+            </p:spPr>
+            <p:txBody>
+              <a:bodyPr wrap="square" rtlCol="0">
+                <a:spAutoFit/>
+              </a:bodyPr>
+              <a:lstStyle/>
+              <a:p>
+                <a:pPr algn="ctr"/>
+                <a14:m>
+                  <m:oMathPara xmlns:m="http://schemas.openxmlformats.org/officeDocument/2006/math">
+                    <m:oMathParaPr>
+                      <m:jc m:val="centerGroup"/>
+                    </m:oMathParaPr>
+                    <m:oMath xmlns:m="http://schemas.openxmlformats.org/officeDocument/2006/math">
+                      <m:sSup>
+                        <m:sSupPr>
+                          <m:ctrlPr>
+                            <a:rPr lang="de-DE" sz="1200" b="0" i="1" smtClean="0">
+                              <a:latin typeface="Cambria Math" panose="02040503050406030204" pitchFamily="18" charset="0"/>
+                            </a:rPr>
+                          </m:ctrlPr>
+                        </m:sSupPr>
+                        <m:e>
+                          <m:r>
+                            <a:rPr lang="de-DE" sz="1200" b="0" i="1" smtClean="0">
+                              <a:latin typeface="Cambria Math" panose="02040503050406030204" pitchFamily="18" charset="0"/>
+                            </a:rPr>
+                            <m:t>𝑛</m:t>
+                          </m:r>
+                        </m:e>
+                        <m:sup>
+                          <m:r>
+                            <a:rPr lang="de-DE" sz="1200" b="0" i="1" smtClean="0">
+                              <a:latin typeface="Cambria Math" panose="02040503050406030204" pitchFamily="18" charset="0"/>
+                            </a:rPr>
+                            <m:t>𝑙</m:t>
+                          </m:r>
+                          <m:r>
+                            <a:rPr lang="de-DE" sz="1200" b="0" i="1" smtClean="0">
+                              <a:latin typeface="Cambria Math" panose="02040503050406030204" pitchFamily="18" charset="0"/>
+                            </a:rPr>
+                            <m:t>−1</m:t>
+                          </m:r>
+                        </m:sup>
+                      </m:sSup>
+                      <m:r>
+                        <a:rPr lang="de-DE" sz="1200" b="0" i="1" smtClean="0">
+                          <a:latin typeface="Cambria Math" panose="02040503050406030204" pitchFamily="18" charset="0"/>
+                        </a:rPr>
+                        <m:t>×1</m:t>
+                      </m:r>
+                    </m:oMath>
+                  </m:oMathPara>
+                </a14:m>
+                <a:endParaRPr lang="de-DE" sz="1200" dirty="0"/>
+              </a:p>
+            </p:txBody>
+          </p:sp>
+        </mc:Choice>
+        <mc:Fallback>
+          <p:sp>
+            <p:nvSpPr>
+              <p:cNvPr id="15" name="Textfeld 14">
+                <a:extLst>
+                  <a:ext uri="{FF2B5EF4-FFF2-40B4-BE49-F238E27FC236}">
+                    <a16:creationId xmlns:a16="http://schemas.microsoft.com/office/drawing/2014/main" id="{1481A1BE-0DF5-47A2-A991-A44404B69EE5}"/>
+                  </a:ext>
+                </a:extLst>
+              </p:cNvPr>
+              <p:cNvSpPr txBox="1">
+                <a:spLocks noRot="1" noChangeAspect="1" noMove="1" noResize="1" noEditPoints="1" noAdjustHandles="1" noChangeArrowheads="1" noChangeShapeType="1" noTextEdit="1"/>
+              </p:cNvSpPr>
+              <p:nvPr/>
+            </p:nvSpPr>
+            <p:spPr>
+              <a:xfrm>
+                <a:off x="7352001" y="3310810"/>
+                <a:ext cx="1113693" cy="280333"/>
+              </a:xfrm>
+              <a:prstGeom prst="rect">
+                <a:avLst/>
+              </a:prstGeom>
+              <a:blipFill>
+                <a:blip r:embed="rId10"/>
+                <a:stretch>
+                  <a:fillRect/>
+                </a:stretch>
+              </a:blipFill>
+            </p:spPr>
+            <p:txBody>
+              <a:bodyPr/>
+              <a:lstStyle/>
+              <a:p>
+                <a:r>
+                  <a:rPr lang="de-DE">
+                    <a:noFill/>
+                  </a:rPr>
+                  <a:t> </a:t>
+                </a:r>
+              </a:p>
+            </p:txBody>
+          </p:sp>
+        </mc:Fallback>
+      </mc:AlternateContent>
+      <mc:AlternateContent xmlns:mc="http://schemas.openxmlformats.org/markup-compatibility/2006">
+        <mc:Choice xmlns:a14="http://schemas.microsoft.com/office/drawing/2010/main" Requires="a14">
+          <p:sp>
+            <p:nvSpPr>
+              <p:cNvPr id="16" name="Textfeld 15">
+                <a:extLst>
+                  <a:ext uri="{FF2B5EF4-FFF2-40B4-BE49-F238E27FC236}">
+                    <a16:creationId xmlns:a16="http://schemas.microsoft.com/office/drawing/2014/main" id="{3286C1D5-6AA4-45C4-AE9C-851598102E16}"/>
+                  </a:ext>
+                </a:extLst>
+              </p:cNvPr>
+              <p:cNvSpPr txBox="1"/>
+              <p:nvPr/>
+            </p:nvSpPr>
+            <p:spPr>
+              <a:xfrm>
+                <a:off x="8344485" y="3310810"/>
+                <a:ext cx="647114" cy="280333"/>
+              </a:xfrm>
+              <a:prstGeom prst="rect">
+                <a:avLst/>
+              </a:prstGeom>
+              <a:noFill/>
+            </p:spPr>
+            <p:txBody>
+              <a:bodyPr wrap="square" rtlCol="0">
+                <a:spAutoFit/>
+              </a:bodyPr>
+              <a:lstStyle/>
+              <a:p>
+                <a:pPr algn="ctr"/>
+                <a14:m>
+                  <m:oMathPara xmlns:m="http://schemas.openxmlformats.org/officeDocument/2006/math">
+                    <m:oMathParaPr>
+                      <m:jc m:val="centerGroup"/>
+                    </m:oMathParaPr>
+                    <m:oMath xmlns:m="http://schemas.openxmlformats.org/officeDocument/2006/math">
+                      <m:sSup>
+                        <m:sSupPr>
+                          <m:ctrlPr>
+                            <a:rPr lang="de-DE" sz="1200" b="0" i="1" smtClean="0">
+                              <a:latin typeface="Cambria Math" panose="02040503050406030204" pitchFamily="18" charset="0"/>
+                            </a:rPr>
+                          </m:ctrlPr>
+                        </m:sSupPr>
+                        <m:e>
+                          <m:r>
+                            <a:rPr lang="de-DE" sz="1200" b="0" i="1" smtClean="0">
+                              <a:latin typeface="Cambria Math" panose="02040503050406030204" pitchFamily="18" charset="0"/>
+                            </a:rPr>
+                            <m:t>𝑛</m:t>
+                          </m:r>
+                        </m:e>
+                        <m:sup>
+                          <m:r>
+                            <a:rPr lang="de-DE" sz="1200" b="0" i="1" smtClean="0">
+                              <a:latin typeface="Cambria Math" panose="02040503050406030204" pitchFamily="18" charset="0"/>
+                            </a:rPr>
+                            <m:t>𝑙</m:t>
+                          </m:r>
+                        </m:sup>
+                      </m:sSup>
+                      <m:r>
+                        <a:rPr lang="de-DE" sz="1200" b="0" i="1" smtClean="0">
+                          <a:latin typeface="Cambria Math" panose="02040503050406030204" pitchFamily="18" charset="0"/>
+                        </a:rPr>
+                        <m:t>×1</m:t>
+                      </m:r>
+                    </m:oMath>
+                  </m:oMathPara>
+                </a14:m>
+                <a:endParaRPr lang="de-DE" sz="1200" dirty="0"/>
+              </a:p>
+            </p:txBody>
+          </p:sp>
+        </mc:Choice>
+        <mc:Fallback>
+          <p:sp>
+            <p:nvSpPr>
+              <p:cNvPr id="16" name="Textfeld 15">
+                <a:extLst>
+                  <a:ext uri="{FF2B5EF4-FFF2-40B4-BE49-F238E27FC236}">
+                    <a16:creationId xmlns:a16="http://schemas.microsoft.com/office/drawing/2014/main" id="{3286C1D5-6AA4-45C4-AE9C-851598102E16}"/>
+                  </a:ext>
+                </a:extLst>
+              </p:cNvPr>
+              <p:cNvSpPr txBox="1">
+                <a:spLocks noRot="1" noChangeAspect="1" noMove="1" noResize="1" noEditPoints="1" noAdjustHandles="1" noChangeArrowheads="1" noChangeShapeType="1" noTextEdit="1"/>
+              </p:cNvSpPr>
+              <p:nvPr/>
+            </p:nvSpPr>
+            <p:spPr>
+              <a:xfrm>
+                <a:off x="8344485" y="3310810"/>
+                <a:ext cx="647114" cy="280333"/>
+              </a:xfrm>
+              <a:prstGeom prst="rect">
+                <a:avLst/>
+              </a:prstGeom>
+              <a:blipFill>
+                <a:blip r:embed="rId11"/>
+                <a:stretch>
+                  <a:fillRect/>
+                </a:stretch>
+              </a:blipFill>
+            </p:spPr>
+            <p:txBody>
+              <a:bodyPr/>
+              <a:lstStyle/>
+              <a:p>
+                <a:r>
+                  <a:rPr lang="de-DE">
+                    <a:noFill/>
+                  </a:rPr>
+                  <a:t> </a:t>
+                </a:r>
+              </a:p>
+            </p:txBody>
+          </p:sp>
+        </mc:Fallback>
+      </mc:AlternateContent>
+      <mc:AlternateContent xmlns:mc="http://schemas.openxmlformats.org/markup-compatibility/2006">
+        <mc:Choice xmlns:a14="http://schemas.microsoft.com/office/drawing/2010/main" Requires="a14">
+          <p:sp>
+            <p:nvSpPr>
+              <p:cNvPr id="17" name="Textfeld 16">
+                <a:extLst>
+                  <a:ext uri="{FF2B5EF4-FFF2-40B4-BE49-F238E27FC236}">
+                    <a16:creationId xmlns:a16="http://schemas.microsoft.com/office/drawing/2014/main" id="{E787C449-758B-462C-BCCB-3AE79AF62796}"/>
+                  </a:ext>
+                </a:extLst>
+              </p:cNvPr>
+              <p:cNvSpPr txBox="1"/>
+              <p:nvPr/>
+            </p:nvSpPr>
+            <p:spPr>
+              <a:xfrm>
+                <a:off x="5672087" y="5273253"/>
+                <a:ext cx="647114" cy="280333"/>
+              </a:xfrm>
+              <a:prstGeom prst="rect">
+                <a:avLst/>
+              </a:prstGeom>
+              <a:noFill/>
+            </p:spPr>
+            <p:txBody>
+              <a:bodyPr wrap="square" rtlCol="0">
+                <a:spAutoFit/>
+              </a:bodyPr>
+              <a:lstStyle/>
+              <a:p>
+                <a:pPr algn="ctr"/>
+                <a14:m>
+                  <m:oMathPara xmlns:m="http://schemas.openxmlformats.org/officeDocument/2006/math">
+                    <m:oMathParaPr>
+                      <m:jc m:val="centerGroup"/>
+                    </m:oMathParaPr>
+                    <m:oMath xmlns:m="http://schemas.openxmlformats.org/officeDocument/2006/math">
+                      <m:sSup>
+                        <m:sSupPr>
+                          <m:ctrlPr>
+                            <a:rPr lang="de-DE" sz="1200" b="0" i="1" smtClean="0">
+                              <a:latin typeface="Cambria Math" panose="02040503050406030204" pitchFamily="18" charset="0"/>
+                            </a:rPr>
+                          </m:ctrlPr>
+                        </m:sSupPr>
+                        <m:e>
+                          <m:r>
+                            <a:rPr lang="de-DE" sz="1200" b="0" i="1" smtClean="0">
+                              <a:latin typeface="Cambria Math" panose="02040503050406030204" pitchFamily="18" charset="0"/>
+                            </a:rPr>
+                            <m:t>𝑛</m:t>
+                          </m:r>
+                        </m:e>
+                        <m:sup>
+                          <m:r>
+                            <a:rPr lang="de-DE" sz="1200" b="0" i="1" smtClean="0">
+                              <a:latin typeface="Cambria Math" panose="02040503050406030204" pitchFamily="18" charset="0"/>
+                            </a:rPr>
+                            <m:t>𝑙</m:t>
+                          </m:r>
+                        </m:sup>
+                      </m:sSup>
+                      <m:r>
+                        <a:rPr lang="de-DE" sz="1200" b="0" i="1" smtClean="0">
+                          <a:latin typeface="Cambria Math" panose="02040503050406030204" pitchFamily="18" charset="0"/>
+                        </a:rPr>
+                        <m:t>×1</m:t>
+                      </m:r>
+                    </m:oMath>
+                  </m:oMathPara>
+                </a14:m>
+                <a:endParaRPr lang="de-DE" sz="1200" dirty="0"/>
+              </a:p>
+            </p:txBody>
+          </p:sp>
+        </mc:Choice>
+        <mc:Fallback>
+          <p:sp>
+            <p:nvSpPr>
+              <p:cNvPr id="17" name="Textfeld 16">
+                <a:extLst>
+                  <a:ext uri="{FF2B5EF4-FFF2-40B4-BE49-F238E27FC236}">
+                    <a16:creationId xmlns:a16="http://schemas.microsoft.com/office/drawing/2014/main" id="{E787C449-758B-462C-BCCB-3AE79AF62796}"/>
+                  </a:ext>
+                </a:extLst>
+              </p:cNvPr>
+              <p:cNvSpPr txBox="1">
+                <a:spLocks noRot="1" noChangeAspect="1" noMove="1" noResize="1" noEditPoints="1" noAdjustHandles="1" noChangeArrowheads="1" noChangeShapeType="1" noTextEdit="1"/>
+              </p:cNvSpPr>
+              <p:nvPr/>
+            </p:nvSpPr>
+            <p:spPr>
+              <a:xfrm>
+                <a:off x="5672087" y="5273253"/>
+                <a:ext cx="647114" cy="280333"/>
+              </a:xfrm>
+              <a:prstGeom prst="rect">
+                <a:avLst/>
+              </a:prstGeom>
+              <a:blipFill>
+                <a:blip r:embed="rId8"/>
+                <a:stretch>
+                  <a:fillRect/>
+                </a:stretch>
+              </a:blipFill>
+            </p:spPr>
+            <p:txBody>
+              <a:bodyPr/>
+              <a:lstStyle/>
+              <a:p>
+                <a:r>
+                  <a:rPr lang="de-DE">
+                    <a:noFill/>
+                  </a:rPr>
+                  <a:t> </a:t>
+                </a:r>
+              </a:p>
+            </p:txBody>
+          </p:sp>
+        </mc:Fallback>
+      </mc:AlternateContent>
+      <mc:AlternateContent xmlns:mc="http://schemas.openxmlformats.org/markup-compatibility/2006">
+        <mc:Choice xmlns:a14="http://schemas.microsoft.com/office/drawing/2010/main" Requires="a14">
+          <p:sp>
+            <p:nvSpPr>
+              <p:cNvPr id="18" name="Textfeld 17">
+                <a:extLst>
+                  <a:ext uri="{FF2B5EF4-FFF2-40B4-BE49-F238E27FC236}">
+                    <a16:creationId xmlns:a16="http://schemas.microsoft.com/office/drawing/2014/main" id="{7F182E11-3A79-4692-9E63-4104E3CEFF8E}"/>
+                  </a:ext>
+                </a:extLst>
+              </p:cNvPr>
+              <p:cNvSpPr txBox="1"/>
+              <p:nvPr/>
+            </p:nvSpPr>
+            <p:spPr>
+              <a:xfrm>
+                <a:off x="1613558" y="6212542"/>
+                <a:ext cx="647114" cy="276999"/>
+              </a:xfrm>
+              <a:prstGeom prst="rect">
+                <a:avLst/>
+              </a:prstGeom>
+              <a:noFill/>
+            </p:spPr>
+            <p:txBody>
+              <a:bodyPr wrap="square" rtlCol="0">
+                <a:spAutoFit/>
+              </a:bodyPr>
+              <a:lstStyle/>
+              <a:p>
+                <a:pPr algn="ctr"/>
+                <a14:m>
+                  <m:oMathPara xmlns:m="http://schemas.openxmlformats.org/officeDocument/2006/math">
+                    <m:oMathParaPr>
+                      <m:jc m:val="centerGroup"/>
+                    </m:oMathParaPr>
+                    <m:oMath xmlns:m="http://schemas.openxmlformats.org/officeDocument/2006/math">
+                      <m:sSup>
+                        <m:sSupPr>
+                          <m:ctrlPr>
+                            <a:rPr lang="de-DE" sz="1200" b="0" i="1" smtClean="0">
+                              <a:latin typeface="Cambria Math" panose="02040503050406030204" pitchFamily="18" charset="0"/>
+                            </a:rPr>
+                          </m:ctrlPr>
+                        </m:sSupPr>
+                        <m:e>
+                          <m:r>
+                            <a:rPr lang="de-DE" sz="1200" b="0" i="1" smtClean="0">
+                              <a:latin typeface="Cambria Math" panose="02040503050406030204" pitchFamily="18" charset="0"/>
+                            </a:rPr>
+                            <m:t>𝑛</m:t>
+                          </m:r>
+                        </m:e>
+                        <m:sup>
+                          <m:r>
+                            <a:rPr lang="de-DE" sz="1200" b="0" i="1" smtClean="0">
+                              <a:latin typeface="Cambria Math" panose="02040503050406030204" pitchFamily="18" charset="0"/>
+                            </a:rPr>
+                            <m:t>𝐿</m:t>
+                          </m:r>
+                        </m:sup>
+                      </m:sSup>
+                      <m:r>
+                        <a:rPr lang="de-DE" sz="1200" b="0" i="1" smtClean="0">
+                          <a:latin typeface="Cambria Math" panose="02040503050406030204" pitchFamily="18" charset="0"/>
+                        </a:rPr>
+                        <m:t>×1</m:t>
+                      </m:r>
+                    </m:oMath>
+                  </m:oMathPara>
+                </a14:m>
+                <a:endParaRPr lang="de-DE" sz="1200" dirty="0"/>
+              </a:p>
+            </p:txBody>
+          </p:sp>
+        </mc:Choice>
+        <mc:Fallback>
+          <p:sp>
+            <p:nvSpPr>
+              <p:cNvPr id="18" name="Textfeld 17">
+                <a:extLst>
+                  <a:ext uri="{FF2B5EF4-FFF2-40B4-BE49-F238E27FC236}">
+                    <a16:creationId xmlns:a16="http://schemas.microsoft.com/office/drawing/2014/main" id="{7F182E11-3A79-4692-9E63-4104E3CEFF8E}"/>
+                  </a:ext>
+                </a:extLst>
+              </p:cNvPr>
+              <p:cNvSpPr txBox="1">
+                <a:spLocks noRot="1" noChangeAspect="1" noMove="1" noResize="1" noEditPoints="1" noAdjustHandles="1" noChangeArrowheads="1" noChangeShapeType="1" noTextEdit="1"/>
+              </p:cNvSpPr>
+              <p:nvPr/>
+            </p:nvSpPr>
+            <p:spPr>
+              <a:xfrm>
+                <a:off x="1613558" y="6212542"/>
+                <a:ext cx="647114" cy="276999"/>
+              </a:xfrm>
+              <a:prstGeom prst="rect">
+                <a:avLst/>
+              </a:prstGeom>
+              <a:blipFill>
+                <a:blip r:embed="rId12"/>
+                <a:stretch>
+                  <a:fillRect/>
+                </a:stretch>
+              </a:blipFill>
+            </p:spPr>
+            <p:txBody>
+              <a:bodyPr/>
+              <a:lstStyle/>
+              <a:p>
+                <a:r>
+                  <a:rPr lang="de-DE">
+                    <a:noFill/>
+                  </a:rPr>
+                  <a:t> </a:t>
+                </a:r>
+              </a:p>
+            </p:txBody>
+          </p:sp>
+        </mc:Fallback>
+      </mc:AlternateContent>
     </p:spTree>
     <p:extLst>
       <p:ext uri="{BB962C8B-B14F-4D97-AF65-F5344CB8AC3E}">
@@ -4685,7 +5767,7 @@
         </p:nvSpPr>
         <p:spPr>
           <a:xfrm>
-            <a:off x="2856451" y="2351922"/>
+            <a:off x="2870518" y="2201871"/>
             <a:ext cx="620785" cy="411060"/>
           </a:xfrm>
           <a:prstGeom prst="rightArrow">
@@ -4797,7 +5879,7 @@
         </p:blipFill>
         <p:spPr>
           <a:xfrm>
-            <a:off x="251714" y="2196200"/>
+            <a:off x="265781" y="2046149"/>
             <a:ext cx="2305050" cy="647700"/>
           </a:xfrm>
           <a:prstGeom prst="rect">
@@ -4826,7 +5908,7 @@
         </p:blipFill>
         <p:spPr>
           <a:xfrm>
-            <a:off x="4080805" y="1579930"/>
+            <a:off x="4094872" y="1429879"/>
             <a:ext cx="7631972" cy="1859565"/>
           </a:xfrm>
           <a:prstGeom prst="rect">
@@ -4886,8 +5968,8 @@
         </p:blipFill>
         <p:spPr>
           <a:xfrm>
-            <a:off x="4822271" y="3572999"/>
-            <a:ext cx="4929931" cy="1681267"/>
+            <a:off x="4390864" y="3733289"/>
+            <a:ext cx="4474719" cy="1526025"/>
           </a:xfrm>
           <a:prstGeom prst="rect">
             <a:avLst/>
@@ -4924,6 +6006,841 @@
           </a:prstGeom>
         </p:spPr>
       </p:pic>
+      <mc:AlternateContent xmlns:mc="http://schemas.openxmlformats.org/markup-compatibility/2006">
+        <mc:Choice xmlns:a14="http://schemas.microsoft.com/office/drawing/2010/main" Requires="a14">
+          <p:sp>
+            <p:nvSpPr>
+              <p:cNvPr id="19" name="Textfeld 18">
+                <a:extLst>
+                  <a:ext uri="{FF2B5EF4-FFF2-40B4-BE49-F238E27FC236}">
+                    <a16:creationId xmlns:a16="http://schemas.microsoft.com/office/drawing/2014/main" id="{B31F2CCD-3F14-4753-B4A3-47935D35612B}"/>
+                  </a:ext>
+                </a:extLst>
+              </p:cNvPr>
+              <p:cNvSpPr txBox="1"/>
+              <p:nvPr/>
+            </p:nvSpPr>
+            <p:spPr>
+              <a:xfrm>
+                <a:off x="3869880" y="3090867"/>
+                <a:ext cx="1041967" cy="280333"/>
+              </a:xfrm>
+              <a:prstGeom prst="rect">
+                <a:avLst/>
+              </a:prstGeom>
+              <a:noFill/>
+            </p:spPr>
+            <p:txBody>
+              <a:bodyPr wrap="square" rtlCol="0">
+                <a:spAutoFit/>
+              </a:bodyPr>
+              <a:lstStyle/>
+              <a:p>
+                <a:pPr algn="ctr"/>
+                <a14:m>
+                  <m:oMathPara xmlns:m="http://schemas.openxmlformats.org/officeDocument/2006/math">
+                    <m:oMathParaPr>
+                      <m:jc m:val="centerGroup"/>
+                    </m:oMathParaPr>
+                    <m:oMath xmlns:m="http://schemas.openxmlformats.org/officeDocument/2006/math">
+                      <m:r>
+                        <a:rPr lang="de-DE" sz="1200" b="0" i="1" smtClean="0">
+                          <a:latin typeface="Cambria Math" panose="02040503050406030204" pitchFamily="18" charset="0"/>
+                        </a:rPr>
+                        <m:t>𝑀</m:t>
+                      </m:r>
+                      <m:r>
+                        <a:rPr lang="de-DE" sz="1200" b="0" i="1" smtClean="0">
+                          <a:latin typeface="Cambria Math" panose="02040503050406030204" pitchFamily="18" charset="0"/>
+                        </a:rPr>
+                        <m:t>×</m:t>
+                      </m:r>
+                      <m:sSup>
+                        <m:sSupPr>
+                          <m:ctrlPr>
+                            <a:rPr lang="de-DE" sz="1200" b="0" i="1" smtClean="0">
+                              <a:latin typeface="Cambria Math" panose="02040503050406030204" pitchFamily="18" charset="0"/>
+                            </a:rPr>
+                          </m:ctrlPr>
+                        </m:sSupPr>
+                        <m:e>
+                          <m:r>
+                            <a:rPr lang="de-DE" sz="1200" b="0" i="1" smtClean="0">
+                              <a:latin typeface="Cambria Math" panose="02040503050406030204" pitchFamily="18" charset="0"/>
+                            </a:rPr>
+                            <m:t>𝑛</m:t>
+                          </m:r>
+                        </m:e>
+                        <m:sup>
+                          <m:r>
+                            <a:rPr lang="de-DE" sz="1200" b="0" i="1" smtClean="0">
+                              <a:latin typeface="Cambria Math" panose="02040503050406030204" pitchFamily="18" charset="0"/>
+                            </a:rPr>
+                            <m:t>𝑙</m:t>
+                          </m:r>
+                        </m:sup>
+                      </m:sSup>
+                      <m:r>
+                        <a:rPr lang="de-DE" sz="1200" b="0" i="1" smtClean="0">
+                          <a:latin typeface="Cambria Math" panose="02040503050406030204" pitchFamily="18" charset="0"/>
+                        </a:rPr>
+                        <m:t>×1</m:t>
+                      </m:r>
+                    </m:oMath>
+                  </m:oMathPara>
+                </a14:m>
+                <a:endParaRPr lang="de-DE" sz="1200" dirty="0"/>
+              </a:p>
+            </p:txBody>
+          </p:sp>
+        </mc:Choice>
+        <mc:Fallback>
+          <p:sp>
+            <p:nvSpPr>
+              <p:cNvPr id="19" name="Textfeld 18">
+                <a:extLst>
+                  <a:ext uri="{FF2B5EF4-FFF2-40B4-BE49-F238E27FC236}">
+                    <a16:creationId xmlns:a16="http://schemas.microsoft.com/office/drawing/2014/main" id="{B31F2CCD-3F14-4753-B4A3-47935D35612B}"/>
+                  </a:ext>
+                </a:extLst>
+              </p:cNvPr>
+              <p:cNvSpPr txBox="1">
+                <a:spLocks noRot="1" noChangeAspect="1" noMove="1" noResize="1" noEditPoints="1" noAdjustHandles="1" noChangeArrowheads="1" noChangeShapeType="1" noTextEdit="1"/>
+              </p:cNvSpPr>
+              <p:nvPr/>
+            </p:nvSpPr>
+            <p:spPr>
+              <a:xfrm>
+                <a:off x="3869880" y="3090867"/>
+                <a:ext cx="1041967" cy="280333"/>
+              </a:xfrm>
+              <a:prstGeom prst="rect">
+                <a:avLst/>
+              </a:prstGeom>
+              <a:blipFill>
+                <a:blip r:embed="rId7"/>
+                <a:stretch>
+                  <a:fillRect/>
+                </a:stretch>
+              </a:blipFill>
+            </p:spPr>
+            <p:txBody>
+              <a:bodyPr/>
+              <a:lstStyle/>
+              <a:p>
+                <a:r>
+                  <a:rPr lang="de-DE">
+                    <a:noFill/>
+                  </a:rPr>
+                  <a:t> </a:t>
+                </a:r>
+              </a:p>
+            </p:txBody>
+          </p:sp>
+        </mc:Fallback>
+      </mc:AlternateContent>
+      <mc:AlternateContent xmlns:mc="http://schemas.openxmlformats.org/markup-compatibility/2006">
+        <mc:Choice xmlns:a14="http://schemas.microsoft.com/office/drawing/2010/main" Requires="a14">
+          <p:sp>
+            <p:nvSpPr>
+              <p:cNvPr id="21" name="Textfeld 20">
+                <a:extLst>
+                  <a:ext uri="{FF2B5EF4-FFF2-40B4-BE49-F238E27FC236}">
+                    <a16:creationId xmlns:a16="http://schemas.microsoft.com/office/drawing/2014/main" id="{0BFD32DA-BB2E-48CA-86CD-0A428FBAF5FF}"/>
+                  </a:ext>
+                </a:extLst>
+              </p:cNvPr>
+              <p:cNvSpPr txBox="1"/>
+              <p:nvPr/>
+            </p:nvSpPr>
+            <p:spPr>
+              <a:xfrm>
+                <a:off x="5848856" y="3289444"/>
+                <a:ext cx="1312060" cy="280333"/>
+              </a:xfrm>
+              <a:prstGeom prst="rect">
+                <a:avLst/>
+              </a:prstGeom>
+              <a:noFill/>
+            </p:spPr>
+            <p:txBody>
+              <a:bodyPr wrap="square" rtlCol="0">
+                <a:spAutoFit/>
+              </a:bodyPr>
+              <a:lstStyle/>
+              <a:p>
+                <a:pPr algn="ctr"/>
+                <a14:m>
+                  <m:oMathPara xmlns:m="http://schemas.openxmlformats.org/officeDocument/2006/math">
+                    <m:oMathParaPr>
+                      <m:jc m:val="centerGroup"/>
+                    </m:oMathParaPr>
+                    <m:oMath xmlns:m="http://schemas.openxmlformats.org/officeDocument/2006/math">
+                      <m:r>
+                        <a:rPr lang="de-DE" sz="1200" b="0" i="1" smtClean="0">
+                          <a:latin typeface="Cambria Math" panose="02040503050406030204" pitchFamily="18" charset="0"/>
+                        </a:rPr>
+                        <m:t>𝑀</m:t>
+                      </m:r>
+                      <m:r>
+                        <a:rPr lang="de-DE" sz="1200" b="0" i="1" smtClean="0">
+                          <a:latin typeface="Cambria Math" panose="02040503050406030204" pitchFamily="18" charset="0"/>
+                        </a:rPr>
+                        <m:t>×</m:t>
+                      </m:r>
+                      <m:sSup>
+                        <m:sSupPr>
+                          <m:ctrlPr>
+                            <a:rPr lang="de-DE" sz="1200" b="0" i="1" smtClean="0">
+                              <a:latin typeface="Cambria Math" panose="02040503050406030204" pitchFamily="18" charset="0"/>
+                            </a:rPr>
+                          </m:ctrlPr>
+                        </m:sSupPr>
+                        <m:e>
+                          <m:r>
+                            <a:rPr lang="de-DE" sz="1200" b="0" i="1" smtClean="0">
+                              <a:latin typeface="Cambria Math" panose="02040503050406030204" pitchFamily="18" charset="0"/>
+                            </a:rPr>
+                            <m:t>𝑛</m:t>
+                          </m:r>
+                        </m:e>
+                        <m:sup>
+                          <m:r>
+                            <a:rPr lang="de-DE" sz="1200" b="0" i="1" smtClean="0">
+                              <a:latin typeface="Cambria Math" panose="02040503050406030204" pitchFamily="18" charset="0"/>
+                            </a:rPr>
+                            <m:t>𝑙</m:t>
+                          </m:r>
+                        </m:sup>
+                      </m:sSup>
+                      <m:r>
+                        <a:rPr lang="de-DE" sz="1200" b="0" i="1" smtClean="0">
+                          <a:latin typeface="Cambria Math" panose="02040503050406030204" pitchFamily="18" charset="0"/>
+                        </a:rPr>
+                        <m:t>×</m:t>
+                      </m:r>
+                      <m:sSup>
+                        <m:sSupPr>
+                          <m:ctrlPr>
+                            <a:rPr lang="de-DE" sz="1200" b="0" i="1" smtClean="0">
+                              <a:latin typeface="Cambria Math" panose="02040503050406030204" pitchFamily="18" charset="0"/>
+                            </a:rPr>
+                          </m:ctrlPr>
+                        </m:sSupPr>
+                        <m:e>
+                          <m:r>
+                            <a:rPr lang="de-DE" sz="1200" b="0" i="1" smtClean="0">
+                              <a:latin typeface="Cambria Math" panose="02040503050406030204" pitchFamily="18" charset="0"/>
+                            </a:rPr>
+                            <m:t>𝑛</m:t>
+                          </m:r>
+                        </m:e>
+                        <m:sup>
+                          <m:r>
+                            <a:rPr lang="de-DE" sz="1200" b="0" i="1" smtClean="0">
+                              <a:latin typeface="Cambria Math" panose="02040503050406030204" pitchFamily="18" charset="0"/>
+                            </a:rPr>
+                            <m:t>𝑙</m:t>
+                          </m:r>
+                          <m:r>
+                            <a:rPr lang="de-DE" sz="1200" b="0" i="1" smtClean="0">
+                              <a:latin typeface="Cambria Math" panose="02040503050406030204" pitchFamily="18" charset="0"/>
+                            </a:rPr>
+                            <m:t>−1</m:t>
+                          </m:r>
+                        </m:sup>
+                      </m:sSup>
+                    </m:oMath>
+                  </m:oMathPara>
+                </a14:m>
+                <a:endParaRPr lang="de-DE" sz="1200" dirty="0"/>
+              </a:p>
+            </p:txBody>
+          </p:sp>
+        </mc:Choice>
+        <mc:Fallback>
+          <p:sp>
+            <p:nvSpPr>
+              <p:cNvPr id="21" name="Textfeld 20">
+                <a:extLst>
+                  <a:ext uri="{FF2B5EF4-FFF2-40B4-BE49-F238E27FC236}">
+                    <a16:creationId xmlns:a16="http://schemas.microsoft.com/office/drawing/2014/main" id="{0BFD32DA-BB2E-48CA-86CD-0A428FBAF5FF}"/>
+                  </a:ext>
+                </a:extLst>
+              </p:cNvPr>
+              <p:cNvSpPr txBox="1">
+                <a:spLocks noRot="1" noChangeAspect="1" noMove="1" noResize="1" noEditPoints="1" noAdjustHandles="1" noChangeArrowheads="1" noChangeShapeType="1" noTextEdit="1"/>
+              </p:cNvSpPr>
+              <p:nvPr/>
+            </p:nvSpPr>
+            <p:spPr>
+              <a:xfrm>
+                <a:off x="5848856" y="3289444"/>
+                <a:ext cx="1312060" cy="280333"/>
+              </a:xfrm>
+              <a:prstGeom prst="rect">
+                <a:avLst/>
+              </a:prstGeom>
+              <a:blipFill>
+                <a:blip r:embed="rId8"/>
+                <a:stretch>
+                  <a:fillRect/>
+                </a:stretch>
+              </a:blipFill>
+            </p:spPr>
+            <p:txBody>
+              <a:bodyPr/>
+              <a:lstStyle/>
+              <a:p>
+                <a:r>
+                  <a:rPr lang="de-DE">
+                    <a:noFill/>
+                  </a:rPr>
+                  <a:t> </a:t>
+                </a:r>
+              </a:p>
+            </p:txBody>
+          </p:sp>
+        </mc:Fallback>
+      </mc:AlternateContent>
+      <mc:AlternateContent xmlns:mc="http://schemas.openxmlformats.org/markup-compatibility/2006">
+        <mc:Choice xmlns:a14="http://schemas.microsoft.com/office/drawing/2010/main" Requires="a14">
+          <p:sp>
+            <p:nvSpPr>
+              <p:cNvPr id="23" name="Textfeld 22">
+                <a:extLst>
+                  <a:ext uri="{FF2B5EF4-FFF2-40B4-BE49-F238E27FC236}">
+                    <a16:creationId xmlns:a16="http://schemas.microsoft.com/office/drawing/2014/main" id="{42CEFC2C-4DFD-4D2E-8A04-2093F413CE27}"/>
+                  </a:ext>
+                </a:extLst>
+              </p:cNvPr>
+              <p:cNvSpPr txBox="1"/>
+              <p:nvPr/>
+            </p:nvSpPr>
+            <p:spPr>
+              <a:xfrm>
+                <a:off x="8772838" y="3115895"/>
+                <a:ext cx="1113693" cy="280333"/>
+              </a:xfrm>
+              <a:prstGeom prst="rect">
+                <a:avLst/>
+              </a:prstGeom>
+              <a:noFill/>
+            </p:spPr>
+            <p:txBody>
+              <a:bodyPr wrap="square" rtlCol="0">
+                <a:spAutoFit/>
+              </a:bodyPr>
+              <a:lstStyle/>
+              <a:p>
+                <a:pPr algn="ctr"/>
+                <a14:m>
+                  <m:oMathPara xmlns:m="http://schemas.openxmlformats.org/officeDocument/2006/math">
+                    <m:oMathParaPr>
+                      <m:jc m:val="centerGroup"/>
+                    </m:oMathParaPr>
+                    <m:oMath xmlns:m="http://schemas.openxmlformats.org/officeDocument/2006/math">
+                      <m:r>
+                        <a:rPr lang="de-DE" sz="1200" b="0" i="1" smtClean="0">
+                          <a:latin typeface="Cambria Math" panose="02040503050406030204" pitchFamily="18" charset="0"/>
+                        </a:rPr>
+                        <m:t>𝑀</m:t>
+                      </m:r>
+                      <m:r>
+                        <a:rPr lang="de-DE" sz="1200" b="0" i="1" smtClean="0">
+                          <a:latin typeface="Cambria Math" panose="02040503050406030204" pitchFamily="18" charset="0"/>
+                        </a:rPr>
+                        <m:t>×</m:t>
+                      </m:r>
+                      <m:sSup>
+                        <m:sSupPr>
+                          <m:ctrlPr>
+                            <a:rPr lang="de-DE" sz="1200" b="0" i="1" smtClean="0">
+                              <a:latin typeface="Cambria Math" panose="02040503050406030204" pitchFamily="18" charset="0"/>
+                            </a:rPr>
+                          </m:ctrlPr>
+                        </m:sSupPr>
+                        <m:e>
+                          <m:r>
+                            <a:rPr lang="de-DE" sz="1200" b="0" i="1" smtClean="0">
+                              <a:latin typeface="Cambria Math" panose="02040503050406030204" pitchFamily="18" charset="0"/>
+                            </a:rPr>
+                            <m:t>𝑛</m:t>
+                          </m:r>
+                        </m:e>
+                        <m:sup>
+                          <m:r>
+                            <a:rPr lang="de-DE" sz="1200" b="0" i="1" smtClean="0">
+                              <a:latin typeface="Cambria Math" panose="02040503050406030204" pitchFamily="18" charset="0"/>
+                            </a:rPr>
+                            <m:t>𝑙</m:t>
+                          </m:r>
+                          <m:r>
+                            <a:rPr lang="de-DE" sz="1200" b="0" i="1" smtClean="0">
+                              <a:latin typeface="Cambria Math" panose="02040503050406030204" pitchFamily="18" charset="0"/>
+                            </a:rPr>
+                            <m:t>−1</m:t>
+                          </m:r>
+                        </m:sup>
+                      </m:sSup>
+                      <m:r>
+                        <a:rPr lang="de-DE" sz="1200" b="0" i="1" smtClean="0">
+                          <a:latin typeface="Cambria Math" panose="02040503050406030204" pitchFamily="18" charset="0"/>
+                        </a:rPr>
+                        <m:t>×1</m:t>
+                      </m:r>
+                    </m:oMath>
+                  </m:oMathPara>
+                </a14:m>
+                <a:endParaRPr lang="de-DE" sz="1200" dirty="0"/>
+              </a:p>
+            </p:txBody>
+          </p:sp>
+        </mc:Choice>
+        <mc:Fallback>
+          <p:sp>
+            <p:nvSpPr>
+              <p:cNvPr id="23" name="Textfeld 22">
+                <a:extLst>
+                  <a:ext uri="{FF2B5EF4-FFF2-40B4-BE49-F238E27FC236}">
+                    <a16:creationId xmlns:a16="http://schemas.microsoft.com/office/drawing/2014/main" id="{42CEFC2C-4DFD-4D2E-8A04-2093F413CE27}"/>
+                  </a:ext>
+                </a:extLst>
+              </p:cNvPr>
+              <p:cNvSpPr txBox="1">
+                <a:spLocks noRot="1" noChangeAspect="1" noMove="1" noResize="1" noEditPoints="1" noAdjustHandles="1" noChangeArrowheads="1" noChangeShapeType="1" noTextEdit="1"/>
+              </p:cNvSpPr>
+              <p:nvPr/>
+            </p:nvSpPr>
+            <p:spPr>
+              <a:xfrm>
+                <a:off x="8772838" y="3115895"/>
+                <a:ext cx="1113693" cy="280333"/>
+              </a:xfrm>
+              <a:prstGeom prst="rect">
+                <a:avLst/>
+              </a:prstGeom>
+              <a:blipFill>
+                <a:blip r:embed="rId9"/>
+                <a:stretch>
+                  <a:fillRect/>
+                </a:stretch>
+              </a:blipFill>
+            </p:spPr>
+            <p:txBody>
+              <a:bodyPr/>
+              <a:lstStyle/>
+              <a:p>
+                <a:r>
+                  <a:rPr lang="de-DE">
+                    <a:noFill/>
+                  </a:rPr>
+                  <a:t> </a:t>
+                </a:r>
+              </a:p>
+            </p:txBody>
+          </p:sp>
+        </mc:Fallback>
+      </mc:AlternateContent>
+      <mc:AlternateContent xmlns:mc="http://schemas.openxmlformats.org/markup-compatibility/2006">
+        <mc:Choice xmlns:a14="http://schemas.microsoft.com/office/drawing/2010/main" Requires="a14">
+          <p:sp>
+            <p:nvSpPr>
+              <p:cNvPr id="24" name="Textfeld 23">
+                <a:extLst>
+                  <a:ext uri="{FF2B5EF4-FFF2-40B4-BE49-F238E27FC236}">
+                    <a16:creationId xmlns:a16="http://schemas.microsoft.com/office/drawing/2014/main" id="{F9E8B238-E3E1-406F-874F-069E8D103B25}"/>
+                  </a:ext>
+                </a:extLst>
+              </p:cNvPr>
+              <p:cNvSpPr txBox="1"/>
+              <p:nvPr/>
+            </p:nvSpPr>
+            <p:spPr>
+              <a:xfrm>
+                <a:off x="10600005" y="3090866"/>
+                <a:ext cx="940192" cy="280333"/>
+              </a:xfrm>
+              <a:prstGeom prst="rect">
+                <a:avLst/>
+              </a:prstGeom>
+              <a:noFill/>
+            </p:spPr>
+            <p:txBody>
+              <a:bodyPr wrap="square" rtlCol="0">
+                <a:spAutoFit/>
+              </a:bodyPr>
+              <a:lstStyle/>
+              <a:p>
+                <a:pPr algn="ctr"/>
+                <a14:m>
+                  <m:oMathPara xmlns:m="http://schemas.openxmlformats.org/officeDocument/2006/math">
+                    <m:oMathParaPr>
+                      <m:jc m:val="centerGroup"/>
+                    </m:oMathParaPr>
+                    <m:oMath xmlns:m="http://schemas.openxmlformats.org/officeDocument/2006/math">
+                      <m:r>
+                        <a:rPr lang="de-DE" sz="1200" b="0" i="1" smtClean="0">
+                          <a:latin typeface="Cambria Math" panose="02040503050406030204" pitchFamily="18" charset="0"/>
+                        </a:rPr>
+                        <m:t>𝑀</m:t>
+                      </m:r>
+                      <m:r>
+                        <a:rPr lang="de-DE" sz="1200" b="0" i="1" smtClean="0">
+                          <a:latin typeface="Cambria Math" panose="02040503050406030204" pitchFamily="18" charset="0"/>
+                        </a:rPr>
+                        <m:t>×</m:t>
+                      </m:r>
+                      <m:sSup>
+                        <m:sSupPr>
+                          <m:ctrlPr>
+                            <a:rPr lang="de-DE" sz="1200" b="0" i="1" smtClean="0">
+                              <a:latin typeface="Cambria Math" panose="02040503050406030204" pitchFamily="18" charset="0"/>
+                            </a:rPr>
+                          </m:ctrlPr>
+                        </m:sSupPr>
+                        <m:e>
+                          <m:r>
+                            <a:rPr lang="de-DE" sz="1200" b="0" i="1" smtClean="0">
+                              <a:latin typeface="Cambria Math" panose="02040503050406030204" pitchFamily="18" charset="0"/>
+                            </a:rPr>
+                            <m:t>𝑛</m:t>
+                          </m:r>
+                        </m:e>
+                        <m:sup>
+                          <m:r>
+                            <a:rPr lang="de-DE" sz="1200" b="0" i="1" smtClean="0">
+                              <a:latin typeface="Cambria Math" panose="02040503050406030204" pitchFamily="18" charset="0"/>
+                            </a:rPr>
+                            <m:t>𝑙</m:t>
+                          </m:r>
+                        </m:sup>
+                      </m:sSup>
+                      <m:r>
+                        <a:rPr lang="de-DE" sz="1200" b="0" i="1" smtClean="0">
+                          <a:latin typeface="Cambria Math" panose="02040503050406030204" pitchFamily="18" charset="0"/>
+                        </a:rPr>
+                        <m:t>×1</m:t>
+                      </m:r>
+                    </m:oMath>
+                  </m:oMathPara>
+                </a14:m>
+                <a:endParaRPr lang="de-DE" sz="1200" dirty="0"/>
+              </a:p>
+            </p:txBody>
+          </p:sp>
+        </mc:Choice>
+        <mc:Fallback>
+          <p:sp>
+            <p:nvSpPr>
+              <p:cNvPr id="24" name="Textfeld 23">
+                <a:extLst>
+                  <a:ext uri="{FF2B5EF4-FFF2-40B4-BE49-F238E27FC236}">
+                    <a16:creationId xmlns:a16="http://schemas.microsoft.com/office/drawing/2014/main" id="{F9E8B238-E3E1-406F-874F-069E8D103B25}"/>
+                  </a:ext>
+                </a:extLst>
+              </p:cNvPr>
+              <p:cNvSpPr txBox="1">
+                <a:spLocks noRot="1" noChangeAspect="1" noMove="1" noResize="1" noEditPoints="1" noAdjustHandles="1" noChangeArrowheads="1" noChangeShapeType="1" noTextEdit="1"/>
+              </p:cNvSpPr>
+              <p:nvPr/>
+            </p:nvSpPr>
+            <p:spPr>
+              <a:xfrm>
+                <a:off x="10600005" y="3090866"/>
+                <a:ext cx="940192" cy="280333"/>
+              </a:xfrm>
+              <a:prstGeom prst="rect">
+                <a:avLst/>
+              </a:prstGeom>
+              <a:blipFill>
+                <a:blip r:embed="rId10"/>
+                <a:stretch>
+                  <a:fillRect/>
+                </a:stretch>
+              </a:blipFill>
+            </p:spPr>
+            <p:txBody>
+              <a:bodyPr/>
+              <a:lstStyle/>
+              <a:p>
+                <a:r>
+                  <a:rPr lang="de-DE">
+                    <a:noFill/>
+                  </a:rPr>
+                  <a:t> </a:t>
+                </a:r>
+              </a:p>
+            </p:txBody>
+          </p:sp>
+        </mc:Fallback>
+      </mc:AlternateContent>
+      <mc:AlternateContent xmlns:mc="http://schemas.openxmlformats.org/markup-compatibility/2006">
+        <mc:Choice xmlns:a14="http://schemas.microsoft.com/office/drawing/2010/main" Requires="a14">
+          <p:sp>
+            <p:nvSpPr>
+              <p:cNvPr id="25" name="Textfeld 24">
+                <a:extLst>
+                  <a:ext uri="{FF2B5EF4-FFF2-40B4-BE49-F238E27FC236}">
+                    <a16:creationId xmlns:a16="http://schemas.microsoft.com/office/drawing/2014/main" id="{9A072912-D28E-42E4-9C74-319B754BABB8}"/>
+                  </a:ext>
+                </a:extLst>
+              </p:cNvPr>
+              <p:cNvSpPr txBox="1"/>
+              <p:nvPr/>
+            </p:nvSpPr>
+            <p:spPr>
+              <a:xfrm>
+                <a:off x="4394798" y="5341070"/>
+                <a:ext cx="1034098" cy="280333"/>
+              </a:xfrm>
+              <a:prstGeom prst="rect">
+                <a:avLst/>
+              </a:prstGeom>
+              <a:noFill/>
+            </p:spPr>
+            <p:txBody>
+              <a:bodyPr wrap="square" rtlCol="0">
+                <a:spAutoFit/>
+              </a:bodyPr>
+              <a:lstStyle/>
+              <a:p>
+                <a:pPr algn="ctr"/>
+                <a14:m>
+                  <m:oMathPara xmlns:m="http://schemas.openxmlformats.org/officeDocument/2006/math">
+                    <m:oMathParaPr>
+                      <m:jc m:val="centerGroup"/>
+                    </m:oMathParaPr>
+                    <m:oMath xmlns:m="http://schemas.openxmlformats.org/officeDocument/2006/math">
+                      <m:r>
+                        <a:rPr lang="de-DE" sz="1200" b="0" i="1" smtClean="0">
+                          <a:latin typeface="Cambria Math" panose="02040503050406030204" pitchFamily="18" charset="0"/>
+                        </a:rPr>
+                        <m:t>𝑀</m:t>
+                      </m:r>
+                      <m:r>
+                        <a:rPr lang="de-DE" sz="1200" b="0" i="1" smtClean="0">
+                          <a:latin typeface="Cambria Math" panose="02040503050406030204" pitchFamily="18" charset="0"/>
+                        </a:rPr>
+                        <m:t>×</m:t>
+                      </m:r>
+                      <m:sSup>
+                        <m:sSupPr>
+                          <m:ctrlPr>
+                            <a:rPr lang="de-DE" sz="1200" b="0" i="1" smtClean="0">
+                              <a:latin typeface="Cambria Math" panose="02040503050406030204" pitchFamily="18" charset="0"/>
+                            </a:rPr>
+                          </m:ctrlPr>
+                        </m:sSupPr>
+                        <m:e>
+                          <m:r>
+                            <a:rPr lang="de-DE" sz="1200" b="0" i="1" smtClean="0">
+                              <a:latin typeface="Cambria Math" panose="02040503050406030204" pitchFamily="18" charset="0"/>
+                            </a:rPr>
+                            <m:t>𝑛</m:t>
+                          </m:r>
+                        </m:e>
+                        <m:sup>
+                          <m:r>
+                            <a:rPr lang="de-DE" sz="1200" b="0" i="1" smtClean="0">
+                              <a:latin typeface="Cambria Math" panose="02040503050406030204" pitchFamily="18" charset="0"/>
+                            </a:rPr>
+                            <m:t>𝑙</m:t>
+                          </m:r>
+                        </m:sup>
+                      </m:sSup>
+                      <m:r>
+                        <a:rPr lang="de-DE" sz="1200" b="0" i="1" smtClean="0">
+                          <a:latin typeface="Cambria Math" panose="02040503050406030204" pitchFamily="18" charset="0"/>
+                        </a:rPr>
+                        <m:t>×1</m:t>
+                      </m:r>
+                    </m:oMath>
+                  </m:oMathPara>
+                </a14:m>
+                <a:endParaRPr lang="de-DE" sz="1200" dirty="0"/>
+              </a:p>
+            </p:txBody>
+          </p:sp>
+        </mc:Choice>
+        <mc:Fallback>
+          <p:sp>
+            <p:nvSpPr>
+              <p:cNvPr id="25" name="Textfeld 24">
+                <a:extLst>
+                  <a:ext uri="{FF2B5EF4-FFF2-40B4-BE49-F238E27FC236}">
+                    <a16:creationId xmlns:a16="http://schemas.microsoft.com/office/drawing/2014/main" id="{9A072912-D28E-42E4-9C74-319B754BABB8}"/>
+                  </a:ext>
+                </a:extLst>
+              </p:cNvPr>
+              <p:cNvSpPr txBox="1">
+                <a:spLocks noRot="1" noChangeAspect="1" noMove="1" noResize="1" noEditPoints="1" noAdjustHandles="1" noChangeArrowheads="1" noChangeShapeType="1" noTextEdit="1"/>
+              </p:cNvSpPr>
+              <p:nvPr/>
+            </p:nvSpPr>
+            <p:spPr>
+              <a:xfrm>
+                <a:off x="4394798" y="5341070"/>
+                <a:ext cx="1034098" cy="280333"/>
+              </a:xfrm>
+              <a:prstGeom prst="rect">
+                <a:avLst/>
+              </a:prstGeom>
+              <a:blipFill>
+                <a:blip r:embed="rId11"/>
+                <a:stretch>
+                  <a:fillRect/>
+                </a:stretch>
+              </a:blipFill>
+            </p:spPr>
+            <p:txBody>
+              <a:bodyPr/>
+              <a:lstStyle/>
+              <a:p>
+                <a:r>
+                  <a:rPr lang="de-DE">
+                    <a:noFill/>
+                  </a:rPr>
+                  <a:t> </a:t>
+                </a:r>
+              </a:p>
+            </p:txBody>
+          </p:sp>
+        </mc:Fallback>
+      </mc:AlternateContent>
+      <mc:AlternateContent xmlns:mc="http://schemas.openxmlformats.org/markup-compatibility/2006">
+        <mc:Choice xmlns:a14="http://schemas.microsoft.com/office/drawing/2010/main" Requires="a14">
+          <p:sp>
+            <p:nvSpPr>
+              <p:cNvPr id="26" name="Textfeld 25">
+                <a:extLst>
+                  <a:ext uri="{FF2B5EF4-FFF2-40B4-BE49-F238E27FC236}">
+                    <a16:creationId xmlns:a16="http://schemas.microsoft.com/office/drawing/2014/main" id="{2D0EF696-C1F6-401A-978C-464DA96A1177}"/>
+                  </a:ext>
+                </a:extLst>
+              </p:cNvPr>
+              <p:cNvSpPr txBox="1"/>
+              <p:nvPr/>
+            </p:nvSpPr>
+            <p:spPr>
+              <a:xfrm>
+                <a:off x="663416" y="6354375"/>
+                <a:ext cx="1033267" cy="276999"/>
+              </a:xfrm>
+              <a:prstGeom prst="rect">
+                <a:avLst/>
+              </a:prstGeom>
+              <a:noFill/>
+            </p:spPr>
+            <p:txBody>
+              <a:bodyPr wrap="square" rtlCol="0">
+                <a:spAutoFit/>
+              </a:bodyPr>
+              <a:lstStyle/>
+              <a:p>
+                <a:pPr algn="ctr"/>
+                <a14:m>
+                  <m:oMathPara xmlns:m="http://schemas.openxmlformats.org/officeDocument/2006/math">
+                    <m:oMathParaPr>
+                      <m:jc m:val="centerGroup"/>
+                    </m:oMathParaPr>
+                    <m:oMath xmlns:m="http://schemas.openxmlformats.org/officeDocument/2006/math">
+                      <m:r>
+                        <a:rPr lang="de-DE" sz="1200" b="0" i="1" smtClean="0">
+                          <a:latin typeface="Cambria Math" panose="02040503050406030204" pitchFamily="18" charset="0"/>
+                        </a:rPr>
+                        <m:t>𝑀</m:t>
+                      </m:r>
+                      <m:r>
+                        <a:rPr lang="de-DE" sz="1200" b="0" i="1" smtClean="0">
+                          <a:latin typeface="Cambria Math" panose="02040503050406030204" pitchFamily="18" charset="0"/>
+                        </a:rPr>
+                        <m:t>×</m:t>
+                      </m:r>
+                      <m:sSup>
+                        <m:sSupPr>
+                          <m:ctrlPr>
+                            <a:rPr lang="de-DE" sz="1200" b="0" i="1" smtClean="0">
+                              <a:latin typeface="Cambria Math" panose="02040503050406030204" pitchFamily="18" charset="0"/>
+                            </a:rPr>
+                          </m:ctrlPr>
+                        </m:sSupPr>
+                        <m:e>
+                          <m:r>
+                            <a:rPr lang="de-DE" sz="1200" b="0" i="1" smtClean="0">
+                              <a:latin typeface="Cambria Math" panose="02040503050406030204" pitchFamily="18" charset="0"/>
+                            </a:rPr>
+                            <m:t>𝑛</m:t>
+                          </m:r>
+                        </m:e>
+                        <m:sup>
+                          <m:r>
+                            <a:rPr lang="de-DE" sz="1200" b="0" i="1" smtClean="0">
+                              <a:latin typeface="Cambria Math" panose="02040503050406030204" pitchFamily="18" charset="0"/>
+                            </a:rPr>
+                            <m:t>𝐿</m:t>
+                          </m:r>
+                        </m:sup>
+                      </m:sSup>
+                      <m:r>
+                        <a:rPr lang="de-DE" sz="1200" b="0" i="1" smtClean="0">
+                          <a:latin typeface="Cambria Math" panose="02040503050406030204" pitchFamily="18" charset="0"/>
+                        </a:rPr>
+                        <m:t>×1</m:t>
+                      </m:r>
+                    </m:oMath>
+                  </m:oMathPara>
+                </a14:m>
+                <a:endParaRPr lang="de-DE" sz="1200" dirty="0"/>
+              </a:p>
+            </p:txBody>
+          </p:sp>
+        </mc:Choice>
+        <mc:Fallback>
+          <p:sp>
+            <p:nvSpPr>
+              <p:cNvPr id="26" name="Textfeld 25">
+                <a:extLst>
+                  <a:ext uri="{FF2B5EF4-FFF2-40B4-BE49-F238E27FC236}">
+                    <a16:creationId xmlns:a16="http://schemas.microsoft.com/office/drawing/2014/main" id="{2D0EF696-C1F6-401A-978C-464DA96A1177}"/>
+                  </a:ext>
+                </a:extLst>
+              </p:cNvPr>
+              <p:cNvSpPr txBox="1">
+                <a:spLocks noRot="1" noChangeAspect="1" noMove="1" noResize="1" noEditPoints="1" noAdjustHandles="1" noChangeArrowheads="1" noChangeShapeType="1" noTextEdit="1"/>
+              </p:cNvSpPr>
+              <p:nvPr/>
+            </p:nvSpPr>
+            <p:spPr>
+              <a:xfrm>
+                <a:off x="663416" y="6354375"/>
+                <a:ext cx="1033267" cy="276999"/>
+              </a:xfrm>
+              <a:prstGeom prst="rect">
+                <a:avLst/>
+              </a:prstGeom>
+              <a:blipFill>
+                <a:blip r:embed="rId12"/>
+                <a:stretch>
+                  <a:fillRect/>
+                </a:stretch>
+              </a:blipFill>
+            </p:spPr>
+            <p:txBody>
+              <a:bodyPr/>
+              <a:lstStyle/>
+              <a:p>
+                <a:r>
+                  <a:rPr lang="de-DE">
+                    <a:noFill/>
+                  </a:rPr>
+                  <a:t> </a:t>
+                </a:r>
+              </a:p>
+            </p:txBody>
+          </p:sp>
+        </mc:Fallback>
+      </mc:AlternateContent>
     </p:spTree>
     <p:extLst>
       <p:ext uri="{BB962C8B-B14F-4D97-AF65-F5344CB8AC3E}">

</xml_diff>

<commit_message>
WIP: Explaining backprop results
</commit_message>
<xml_diff>
--- a/theory/result_presentation.pptx
+++ b/theory/result_presentation.pptx
@@ -5,7 +5,7 @@
     <p:sldMasterId id="2147483648" r:id="rId1"/>
   </p:sldMasterIdLst>
   <p:notesMasterIdLst>
-    <p:notesMasterId r:id="rId8"/>
+    <p:notesMasterId r:id="rId9"/>
   </p:notesMasterIdLst>
   <p:sldIdLst>
     <p:sldId id="256" r:id="rId2"/>
@@ -14,6 +14,7 @@
     <p:sldId id="259" r:id="rId5"/>
     <p:sldId id="260" r:id="rId6"/>
     <p:sldId id="261" r:id="rId7"/>
+    <p:sldId id="262" r:id="rId8"/>
   </p:sldIdLst>
   <p:sldSz cx="12192000" cy="6858000"/>
   <p:notesSz cx="6858000" cy="9144000"/>
@@ -112,6 +113,11 @@
       </a:defRPr>
     </a:lvl9pPr>
   </p:defaultTextStyle>
+  <p:extLst>
+    <p:ext uri="{EFAFB233-063F-42B5-8137-9DF3F51BA10A}">
+      <p15:sldGuideLst xmlns:p15="http://schemas.microsoft.com/office/powerpoint/2012/main"/>
+    </p:ext>
+  </p:extLst>
 </p:presentation>
 </file>
 
@@ -197,7 +203,7 @@
           <a:p>
             <a:fld id="{8EB49EC5-088D-473F-9BFC-E2740B5DA688}" type="datetimeFigureOut">
               <a:rPr lang="de-DE" smtClean="0"/>
-              <a:t>05.04.2022</a:t>
+              <a:t>06.04.2022</a:t>
             </a:fld>
             <a:endParaRPr lang="de-DE"/>
           </a:p>
@@ -875,7 +881,7 @@
           <a:p>
             <a:fld id="{E47F9164-12F9-48A6-9622-CDF71CB57A75}" type="datetimeFigureOut">
               <a:rPr lang="de-DE" smtClean="0"/>
-              <a:t>05.04.2022</a:t>
+              <a:t>06.04.2022</a:t>
             </a:fld>
             <a:endParaRPr lang="de-DE"/>
           </a:p>
@@ -1073,7 +1079,7 @@
           <a:p>
             <a:fld id="{E47F9164-12F9-48A6-9622-CDF71CB57A75}" type="datetimeFigureOut">
               <a:rPr lang="de-DE" smtClean="0"/>
-              <a:t>05.04.2022</a:t>
+              <a:t>06.04.2022</a:t>
             </a:fld>
             <a:endParaRPr lang="de-DE"/>
           </a:p>
@@ -1281,7 +1287,7 @@
           <a:p>
             <a:fld id="{E47F9164-12F9-48A6-9622-CDF71CB57A75}" type="datetimeFigureOut">
               <a:rPr lang="de-DE" smtClean="0"/>
-              <a:t>05.04.2022</a:t>
+              <a:t>06.04.2022</a:t>
             </a:fld>
             <a:endParaRPr lang="de-DE"/>
           </a:p>
@@ -1479,7 +1485,7 @@
           <a:p>
             <a:fld id="{E47F9164-12F9-48A6-9622-CDF71CB57A75}" type="datetimeFigureOut">
               <a:rPr lang="de-DE" smtClean="0"/>
-              <a:t>05.04.2022</a:t>
+              <a:t>06.04.2022</a:t>
             </a:fld>
             <a:endParaRPr lang="de-DE"/>
           </a:p>
@@ -1754,7 +1760,7 @@
           <a:p>
             <a:fld id="{E47F9164-12F9-48A6-9622-CDF71CB57A75}" type="datetimeFigureOut">
               <a:rPr lang="de-DE" smtClean="0"/>
-              <a:t>05.04.2022</a:t>
+              <a:t>06.04.2022</a:t>
             </a:fld>
             <a:endParaRPr lang="de-DE"/>
           </a:p>
@@ -2019,7 +2025,7 @@
           <a:p>
             <a:fld id="{E47F9164-12F9-48A6-9622-CDF71CB57A75}" type="datetimeFigureOut">
               <a:rPr lang="de-DE" smtClean="0"/>
-              <a:t>05.04.2022</a:t>
+              <a:t>06.04.2022</a:t>
             </a:fld>
             <a:endParaRPr lang="de-DE"/>
           </a:p>
@@ -2431,7 +2437,7 @@
           <a:p>
             <a:fld id="{E47F9164-12F9-48A6-9622-CDF71CB57A75}" type="datetimeFigureOut">
               <a:rPr lang="de-DE" smtClean="0"/>
-              <a:t>05.04.2022</a:t>
+              <a:t>06.04.2022</a:t>
             </a:fld>
             <a:endParaRPr lang="de-DE"/>
           </a:p>
@@ -2572,7 +2578,7 @@
           <a:p>
             <a:fld id="{E47F9164-12F9-48A6-9622-CDF71CB57A75}" type="datetimeFigureOut">
               <a:rPr lang="de-DE" smtClean="0"/>
-              <a:t>05.04.2022</a:t>
+              <a:t>06.04.2022</a:t>
             </a:fld>
             <a:endParaRPr lang="de-DE"/>
           </a:p>
@@ -2685,7 +2691,7 @@
           <a:p>
             <a:fld id="{E47F9164-12F9-48A6-9622-CDF71CB57A75}" type="datetimeFigureOut">
               <a:rPr lang="de-DE" smtClean="0"/>
-              <a:t>05.04.2022</a:t>
+              <a:t>06.04.2022</a:t>
             </a:fld>
             <a:endParaRPr lang="de-DE"/>
           </a:p>
@@ -2996,7 +3002,7 @@
           <a:p>
             <a:fld id="{E47F9164-12F9-48A6-9622-CDF71CB57A75}" type="datetimeFigureOut">
               <a:rPr lang="de-DE" smtClean="0"/>
-              <a:t>05.04.2022</a:t>
+              <a:t>06.04.2022</a:t>
             </a:fld>
             <a:endParaRPr lang="de-DE"/>
           </a:p>
@@ -3284,7 +3290,7 @@
           <a:p>
             <a:fld id="{E47F9164-12F9-48A6-9622-CDF71CB57A75}" type="datetimeFigureOut">
               <a:rPr lang="de-DE" smtClean="0"/>
-              <a:t>05.04.2022</a:t>
+              <a:t>06.04.2022</a:t>
             </a:fld>
             <a:endParaRPr lang="de-DE"/>
           </a:p>
@@ -3525,7 +3531,7 @@
           <a:p>
             <a:fld id="{E47F9164-12F9-48A6-9622-CDF71CB57A75}" type="datetimeFigureOut">
               <a:rPr lang="de-DE" smtClean="0"/>
-              <a:t>05.04.2022</a:t>
+              <a:t>06.04.2022</a:t>
             </a:fld>
             <a:endParaRPr lang="de-DE"/>
           </a:p>
@@ -4370,8 +4376,8 @@
           </a:prstGeom>
         </p:spPr>
       </p:pic>
-      <mc:AlternateContent xmlns:mc="http://schemas.openxmlformats.org/markup-compatibility/2006">
-        <mc:Choice xmlns:a14="http://schemas.microsoft.com/office/drawing/2010/main" Requires="a14">
+      <mc:AlternateContent xmlns:mc="http://schemas.openxmlformats.org/markup-compatibility/2006" xmlns:a14="http://schemas.microsoft.com/office/drawing/2010/main">
+        <mc:Choice Requires="a14">
           <p:sp>
             <p:nvSpPr>
               <p:cNvPr id="14" name="Textfeld 13">
@@ -4559,7 +4565,7 @@
             </p:txBody>
           </p:sp>
         </mc:Choice>
-        <mc:Fallback>
+        <mc:Fallback xmlns="">
           <p:sp>
             <p:nvSpPr>
               <p:cNvPr id="14" name="Textfeld 13">
@@ -4924,8 +4930,8 @@
           </a:prstGeom>
         </p:spPr>
       </p:pic>
-      <mc:AlternateContent xmlns:mc="http://schemas.openxmlformats.org/markup-compatibility/2006">
-        <mc:Choice xmlns:a14="http://schemas.microsoft.com/office/drawing/2010/main" Requires="a14">
+      <mc:AlternateContent xmlns:mc="http://schemas.openxmlformats.org/markup-compatibility/2006" xmlns:a14="http://schemas.microsoft.com/office/drawing/2010/main">
+        <mc:Choice Requires="a14">
           <p:sp>
             <p:nvSpPr>
               <p:cNvPr id="10" name="Textfeld 9">
@@ -5000,7 +5006,7 @@
             </p:txBody>
           </p:sp>
         </mc:Choice>
-        <mc:Fallback>
+        <mc:Fallback xmlns="">
           <p:sp>
             <p:nvSpPr>
               <p:cNvPr id="10" name="Textfeld 9">
@@ -5045,8 +5051,8 @@
           </p:sp>
         </mc:Fallback>
       </mc:AlternateContent>
-      <mc:AlternateContent xmlns:mc="http://schemas.openxmlformats.org/markup-compatibility/2006">
-        <mc:Choice xmlns:a14="http://schemas.microsoft.com/office/drawing/2010/main" Requires="a14">
+      <mc:AlternateContent xmlns:mc="http://schemas.openxmlformats.org/markup-compatibility/2006" xmlns:a14="http://schemas.microsoft.com/office/drawing/2010/main">
+        <mc:Choice Requires="a14">
           <p:sp>
             <p:nvSpPr>
               <p:cNvPr id="14" name="Textfeld 13">
@@ -5152,7 +5158,7 @@
             </p:txBody>
           </p:sp>
         </mc:Choice>
-        <mc:Fallback>
+        <mc:Fallback xmlns="">
           <p:sp>
             <p:nvSpPr>
               <p:cNvPr id="14" name="Textfeld 13">
@@ -5197,8 +5203,8 @@
           </p:sp>
         </mc:Fallback>
       </mc:AlternateContent>
-      <mc:AlternateContent xmlns:mc="http://schemas.openxmlformats.org/markup-compatibility/2006">
-        <mc:Choice xmlns:a14="http://schemas.microsoft.com/office/drawing/2010/main" Requires="a14">
+      <mc:AlternateContent xmlns:mc="http://schemas.openxmlformats.org/markup-compatibility/2006" xmlns:a14="http://schemas.microsoft.com/office/drawing/2010/main">
+        <mc:Choice Requires="a14">
           <p:sp>
             <p:nvSpPr>
               <p:cNvPr id="15" name="Textfeld 14">
@@ -5279,7 +5285,7 @@
             </p:txBody>
           </p:sp>
         </mc:Choice>
-        <mc:Fallback>
+        <mc:Fallback xmlns="">
           <p:sp>
             <p:nvSpPr>
               <p:cNvPr id="15" name="Textfeld 14">
@@ -5324,8 +5330,8 @@
           </p:sp>
         </mc:Fallback>
       </mc:AlternateContent>
-      <mc:AlternateContent xmlns:mc="http://schemas.openxmlformats.org/markup-compatibility/2006">
-        <mc:Choice xmlns:a14="http://schemas.microsoft.com/office/drawing/2010/main" Requires="a14">
+      <mc:AlternateContent xmlns:mc="http://schemas.openxmlformats.org/markup-compatibility/2006" xmlns:a14="http://schemas.microsoft.com/office/drawing/2010/main">
+        <mc:Choice Requires="a14">
           <p:sp>
             <p:nvSpPr>
               <p:cNvPr id="16" name="Textfeld 15">
@@ -5400,7 +5406,7 @@
             </p:txBody>
           </p:sp>
         </mc:Choice>
-        <mc:Fallback>
+        <mc:Fallback xmlns="">
           <p:sp>
             <p:nvSpPr>
               <p:cNvPr id="16" name="Textfeld 15">
@@ -5445,8 +5451,8 @@
           </p:sp>
         </mc:Fallback>
       </mc:AlternateContent>
-      <mc:AlternateContent xmlns:mc="http://schemas.openxmlformats.org/markup-compatibility/2006">
-        <mc:Choice xmlns:a14="http://schemas.microsoft.com/office/drawing/2010/main" Requires="a14">
+      <mc:AlternateContent xmlns:mc="http://schemas.openxmlformats.org/markup-compatibility/2006" xmlns:a14="http://schemas.microsoft.com/office/drawing/2010/main">
+        <mc:Choice Requires="a14">
           <p:sp>
             <p:nvSpPr>
               <p:cNvPr id="17" name="Textfeld 16">
@@ -5521,7 +5527,7 @@
             </p:txBody>
           </p:sp>
         </mc:Choice>
-        <mc:Fallback>
+        <mc:Fallback xmlns="">
           <p:sp>
             <p:nvSpPr>
               <p:cNvPr id="17" name="Textfeld 16">
@@ -5566,8 +5572,8 @@
           </p:sp>
         </mc:Fallback>
       </mc:AlternateContent>
-      <mc:AlternateContent xmlns:mc="http://schemas.openxmlformats.org/markup-compatibility/2006">
-        <mc:Choice xmlns:a14="http://schemas.microsoft.com/office/drawing/2010/main" Requires="a14">
+      <mc:AlternateContent xmlns:mc="http://schemas.openxmlformats.org/markup-compatibility/2006" xmlns:a14="http://schemas.microsoft.com/office/drawing/2010/main">
+        <mc:Choice Requires="a14">
           <p:sp>
             <p:nvSpPr>
               <p:cNvPr id="18" name="Textfeld 17">
@@ -5642,7 +5648,7 @@
             </p:txBody>
           </p:sp>
         </mc:Choice>
-        <mc:Fallback>
+        <mc:Fallback xmlns="">
           <p:sp>
             <p:nvSpPr>
               <p:cNvPr id="18" name="Textfeld 17">
@@ -6006,8 +6012,8 @@
           </a:prstGeom>
         </p:spPr>
       </p:pic>
-      <mc:AlternateContent xmlns:mc="http://schemas.openxmlformats.org/markup-compatibility/2006">
-        <mc:Choice xmlns:a14="http://schemas.microsoft.com/office/drawing/2010/main" Requires="a14">
+      <mc:AlternateContent xmlns:mc="http://schemas.openxmlformats.org/markup-compatibility/2006" xmlns:a14="http://schemas.microsoft.com/office/drawing/2010/main">
+        <mc:Choice Requires="a14">
           <p:sp>
             <p:nvSpPr>
               <p:cNvPr id="19" name="Textfeld 18">
@@ -6094,7 +6100,7 @@
             </p:txBody>
           </p:sp>
         </mc:Choice>
-        <mc:Fallback>
+        <mc:Fallback xmlns="">
           <p:sp>
             <p:nvSpPr>
               <p:cNvPr id="19" name="Textfeld 18">
@@ -6139,8 +6145,8 @@
           </p:sp>
         </mc:Fallback>
       </mc:AlternateContent>
-      <mc:AlternateContent xmlns:mc="http://schemas.openxmlformats.org/markup-compatibility/2006">
-        <mc:Choice xmlns:a14="http://schemas.microsoft.com/office/drawing/2010/main" Requires="a14">
+      <mc:AlternateContent xmlns:mc="http://schemas.openxmlformats.org/markup-compatibility/2006" xmlns:a14="http://schemas.microsoft.com/office/drawing/2010/main">
+        <mc:Choice Requires="a14">
           <p:sp>
             <p:nvSpPr>
               <p:cNvPr id="21" name="Textfeld 20">
@@ -6258,7 +6264,7 @@
             </p:txBody>
           </p:sp>
         </mc:Choice>
-        <mc:Fallback>
+        <mc:Fallback xmlns="">
           <p:sp>
             <p:nvSpPr>
               <p:cNvPr id="21" name="Textfeld 20">
@@ -6303,8 +6309,8 @@
           </p:sp>
         </mc:Fallback>
       </mc:AlternateContent>
-      <mc:AlternateContent xmlns:mc="http://schemas.openxmlformats.org/markup-compatibility/2006">
-        <mc:Choice xmlns:a14="http://schemas.microsoft.com/office/drawing/2010/main" Requires="a14">
+      <mc:AlternateContent xmlns:mc="http://schemas.openxmlformats.org/markup-compatibility/2006" xmlns:a14="http://schemas.microsoft.com/office/drawing/2010/main">
+        <mc:Choice Requires="a14">
           <p:sp>
             <p:nvSpPr>
               <p:cNvPr id="23" name="Textfeld 22">
@@ -6397,7 +6403,7 @@
             </p:txBody>
           </p:sp>
         </mc:Choice>
-        <mc:Fallback>
+        <mc:Fallback xmlns="">
           <p:sp>
             <p:nvSpPr>
               <p:cNvPr id="23" name="Textfeld 22">
@@ -6442,8 +6448,8 @@
           </p:sp>
         </mc:Fallback>
       </mc:AlternateContent>
-      <mc:AlternateContent xmlns:mc="http://schemas.openxmlformats.org/markup-compatibility/2006">
-        <mc:Choice xmlns:a14="http://schemas.microsoft.com/office/drawing/2010/main" Requires="a14">
+      <mc:AlternateContent xmlns:mc="http://schemas.openxmlformats.org/markup-compatibility/2006" xmlns:a14="http://schemas.microsoft.com/office/drawing/2010/main">
+        <mc:Choice Requires="a14">
           <p:sp>
             <p:nvSpPr>
               <p:cNvPr id="24" name="Textfeld 23">
@@ -6530,7 +6536,7 @@
             </p:txBody>
           </p:sp>
         </mc:Choice>
-        <mc:Fallback>
+        <mc:Fallback xmlns="">
           <p:sp>
             <p:nvSpPr>
               <p:cNvPr id="24" name="Textfeld 23">
@@ -6575,8 +6581,8 @@
           </p:sp>
         </mc:Fallback>
       </mc:AlternateContent>
-      <mc:AlternateContent xmlns:mc="http://schemas.openxmlformats.org/markup-compatibility/2006">
-        <mc:Choice xmlns:a14="http://schemas.microsoft.com/office/drawing/2010/main" Requires="a14">
+      <mc:AlternateContent xmlns:mc="http://schemas.openxmlformats.org/markup-compatibility/2006" xmlns:a14="http://schemas.microsoft.com/office/drawing/2010/main">
+        <mc:Choice Requires="a14">
           <p:sp>
             <p:nvSpPr>
               <p:cNvPr id="25" name="Textfeld 24">
@@ -6663,7 +6669,7 @@
             </p:txBody>
           </p:sp>
         </mc:Choice>
-        <mc:Fallback>
+        <mc:Fallback xmlns="">
           <p:sp>
             <p:nvSpPr>
               <p:cNvPr id="25" name="Textfeld 24">
@@ -6708,8 +6714,8 @@
           </p:sp>
         </mc:Fallback>
       </mc:AlternateContent>
-      <mc:AlternateContent xmlns:mc="http://schemas.openxmlformats.org/markup-compatibility/2006">
-        <mc:Choice xmlns:a14="http://schemas.microsoft.com/office/drawing/2010/main" Requires="a14">
+      <mc:AlternateContent xmlns:mc="http://schemas.openxmlformats.org/markup-compatibility/2006" xmlns:a14="http://schemas.microsoft.com/office/drawing/2010/main">
+        <mc:Choice Requires="a14">
           <p:sp>
             <p:nvSpPr>
               <p:cNvPr id="26" name="Textfeld 25">
@@ -6796,7 +6802,7 @@
             </p:txBody>
           </p:sp>
         </mc:Choice>
-        <mc:Fallback>
+        <mc:Fallback xmlns="">
           <p:sp>
             <p:nvSpPr>
               <p:cNvPr id="26" name="Textfeld 25">
@@ -6845,6 +6851,76 @@
     <p:extLst>
       <p:ext uri="{BB962C8B-B14F-4D97-AF65-F5344CB8AC3E}">
         <p14:creationId xmlns:p14="http://schemas.microsoft.com/office/powerpoint/2010/main" val="4250021778"/>
+      </p:ext>
+    </p:extLst>
+  </p:cSld>
+  <p:clrMapOvr>
+    <a:masterClrMapping/>
+  </p:clrMapOvr>
+</p:sld>
+</file>
+
+<file path=ppt/slides/slide7.xml><?xml version="1.0" encoding="utf-8"?>
+<p:sld xmlns:a="http://schemas.openxmlformats.org/drawingml/2006/main" xmlns:r="http://schemas.openxmlformats.org/officeDocument/2006/relationships" xmlns:p="http://schemas.openxmlformats.org/presentationml/2006/main">
+  <p:cSld>
+    <p:spTree>
+      <p:nvGrpSpPr>
+        <p:cNvPr id="1" name=""/>
+        <p:cNvGrpSpPr/>
+        <p:nvPr/>
+      </p:nvGrpSpPr>
+      <p:grpSpPr>
+        <a:xfrm>
+          <a:off x="0" y="0"/>
+          <a:ext cx="0" cy="0"/>
+          <a:chOff x="0" y="0"/>
+          <a:chExt cx="0" cy="0"/>
+        </a:xfrm>
+      </p:grpSpPr>
+      <p:sp>
+        <p:nvSpPr>
+          <p:cNvPr id="2" name="Titel 1">
+            <a:extLst>
+              <a:ext uri="{FF2B5EF4-FFF2-40B4-BE49-F238E27FC236}">
+                <a16:creationId xmlns:a16="http://schemas.microsoft.com/office/drawing/2014/main" id="{2911F67F-327B-4C51-B9E3-A1D3BCC720A5}"/>
+              </a:ext>
+            </a:extLst>
+          </p:cNvPr>
+          <p:cNvSpPr>
+            <a:spLocks noGrp="1"/>
+          </p:cNvSpPr>
+          <p:nvPr>
+            <p:ph type="title"/>
+          </p:nvPr>
+        </p:nvSpPr>
+        <p:spPr/>
+        <p:txBody>
+          <a:bodyPr/>
+          <a:lstStyle/>
+          <a:p>
+            <a:r>
+              <a:rPr lang="de-DE" dirty="0"/>
+              <a:t>Mathematische Herleitungen</a:t>
+            </a:r>
+            <a:br>
+              <a:rPr lang="de-DE" dirty="0"/>
+            </a:br>
+            <a:r>
+              <a:rPr lang="de-DE" sz="2400" dirty="0" err="1"/>
+              <a:t>Backward</a:t>
+            </a:r>
+            <a:r>
+              <a:rPr lang="de-DE" sz="2400" dirty="0"/>
+              <a:t>-Propagation für ein einziges Input</a:t>
+            </a:r>
+            <a:endParaRPr lang="de-DE" dirty="0"/>
+          </a:p>
+        </p:txBody>
+      </p:sp>
+    </p:spTree>
+    <p:extLst>
+      <p:ext uri="{BB962C8B-B14F-4D97-AF65-F5344CB8AC3E}">
+        <p14:creationId xmlns:p14="http://schemas.microsoft.com/office/powerpoint/2010/main" val="713478221"/>
       </p:ext>
     </p:extLst>
   </p:cSld>

</xml_diff>